<commit_message>
preparing the exam preview for the SDS part
</commit_message>
<xml_diff>
--- a/lectures/14_SDS_exam-preview/14_Streaming-Data-Science_exam-preview.pptx
+++ b/lectures/14_SDS_exam-preview/14_Streaming-Data-Science_exam-preview.pptx
@@ -5,22 +5,24 @@
     <p:sldMasterId id="2147483660" r:id="rId1"/>
   </p:sldMasterIdLst>
   <p:notesMasterIdLst>
-    <p:notesMasterId r:id="rId15"/>
+    <p:notesMasterId r:id="rId17"/>
   </p:notesMasterIdLst>
   <p:sldIdLst>
     <p:sldId id="1140" r:id="rId2"/>
     <p:sldId id="1154" r:id="rId3"/>
-    <p:sldId id="1147" r:id="rId4"/>
-    <p:sldId id="1149" r:id="rId5"/>
-    <p:sldId id="1158" r:id="rId6"/>
+    <p:sldId id="1149" r:id="rId4"/>
+    <p:sldId id="1150" r:id="rId5"/>
+    <p:sldId id="1147" r:id="rId6"/>
     <p:sldId id="1148" r:id="rId7"/>
-    <p:sldId id="1150" r:id="rId8"/>
-    <p:sldId id="1157" r:id="rId9"/>
-    <p:sldId id="1146" r:id="rId10"/>
-    <p:sldId id="1155" r:id="rId11"/>
-    <p:sldId id="1159" r:id="rId12"/>
-    <p:sldId id="1151" r:id="rId13"/>
-    <p:sldId id="1153" r:id="rId14"/>
+    <p:sldId id="1158" r:id="rId8"/>
+    <p:sldId id="1159" r:id="rId9"/>
+    <p:sldId id="1151" r:id="rId10"/>
+    <p:sldId id="1146" r:id="rId11"/>
+    <p:sldId id="1155" r:id="rId12"/>
+    <p:sldId id="1160" r:id="rId13"/>
+    <p:sldId id="1161" r:id="rId14"/>
+    <p:sldId id="1157" r:id="rId15"/>
+    <p:sldId id="1153" r:id="rId16"/>
   </p:sldIdLst>
   <p:sldSz cx="12192000" cy="6858000"/>
   <p:notesSz cx="6858000" cy="9144000"/>
@@ -209,7 +211,7 @@
           <a:p>
             <a:fld id="{26455981-B11C-FF41-9507-47548C7C8AB8}" type="datetimeFigureOut">
               <a:rPr lang="en-US" smtClean="0"/>
-              <a:t>12/15/22</a:t>
+              <a:t>12/1/23</a:t>
             </a:fld>
             <a:endParaRPr lang="en-US"/>
           </a:p>
@@ -579,7 +581,7 @@
       </p:grpSpPr>
       <p:sp>
         <p:nvSpPr>
-          <p:cNvPr id="2" name="Segnaposto immagine diapositiva 1"/>
+          <p:cNvPr id="2" name="Slide Image Placeholder 1"/>
           <p:cNvSpPr>
             <a:spLocks noGrp="1" noRot="1" noChangeAspect="1"/>
           </p:cNvSpPr>
@@ -591,7 +593,7 @@
       </p:sp>
       <p:sp>
         <p:nvSpPr>
-          <p:cNvPr id="3" name="Segnaposto note 2"/>
+          <p:cNvPr id="3" name="Notes Placeholder 2"/>
           <p:cNvSpPr>
             <a:spLocks noGrp="1"/>
           </p:cNvSpPr>
@@ -604,33 +606,13 @@
           <a:bodyPr/>
           <a:lstStyle/>
           <a:p>
-            <a:pPr marL="0" marR="0" lvl="0" indent="0" algn="l" defTabSz="914400" rtl="0" eaLnBrk="1" fontAlgn="auto" latinLnBrk="0" hangingPunct="1">
-              <a:lnSpc>
-                <a:spcPct val="100000"/>
-              </a:lnSpc>
-              <a:spcBef>
-                <a:spcPts val="0"/>
-              </a:spcBef>
-              <a:spcAft>
-                <a:spcPts val="0"/>
-              </a:spcAft>
-              <a:buClrTx/>
-              <a:buSzTx/>
-              <a:buFontTx/>
-              <a:buNone/>
-              <a:tabLst/>
-              <a:defRPr/>
-            </a:pPr>
-            <a:endParaRPr lang="en-US" dirty="0">
-              <a:latin typeface="Calibri" panose="020F0502020204030204" pitchFamily="34" charset="0"/>
-              <a:cs typeface="Calibri" panose="020F0502020204030204" pitchFamily="34" charset="0"/>
-            </a:endParaRPr>
-          </a:p>
-        </p:txBody>
-      </p:sp>
-      <p:sp>
-        <p:nvSpPr>
-          <p:cNvPr id="4" name="Segnaposto numero diapositiva 3"/>
+            <a:endParaRPr lang="en-US" dirty="0"/>
+          </a:p>
+        </p:txBody>
+      </p:sp>
+      <p:sp>
+        <p:nvSpPr>
+          <p:cNvPr id="4" name="Slide Number Placeholder 3"/>
           <p:cNvSpPr>
             <a:spLocks noGrp="1"/>
           </p:cNvSpPr>
@@ -645,7 +627,7 @@
           <a:p>
             <a:fld id="{E5C51989-9A18-B94A-8794-50FDA8B77593}" type="slidenum">
               <a:rPr lang="en-US" smtClean="0"/>
-              <a:t>12</a:t>
+              <a:t>14</a:t>
             </a:fld>
             <a:endParaRPr lang="en-US"/>
           </a:p>
@@ -654,7 +636,7 @@
     </p:spTree>
     <p:extLst>
       <p:ext uri="{BB962C8B-B14F-4D97-AF65-F5344CB8AC3E}">
-        <p14:creationId xmlns:p14="http://schemas.microsoft.com/office/powerpoint/2010/main" val="3694539174"/>
+        <p14:creationId xmlns:p14="http://schemas.microsoft.com/office/powerpoint/2010/main" val="2570877332"/>
       </p:ext>
     </p:extLst>
   </p:cSld>
@@ -738,7 +720,7 @@
     </p:spTree>
     <p:extLst>
       <p:ext uri="{BB962C8B-B14F-4D97-AF65-F5344CB8AC3E}">
-        <p14:creationId xmlns:p14="http://schemas.microsoft.com/office/powerpoint/2010/main" val="743261006"/>
+        <p14:creationId xmlns:p14="http://schemas.microsoft.com/office/powerpoint/2010/main" val="2484033871"/>
       </p:ext>
     </p:extLst>
   </p:cSld>
@@ -822,7 +804,7 @@
     </p:spTree>
     <p:extLst>
       <p:ext uri="{BB962C8B-B14F-4D97-AF65-F5344CB8AC3E}">
-        <p14:creationId xmlns:p14="http://schemas.microsoft.com/office/powerpoint/2010/main" val="2484033871"/>
+        <p14:creationId xmlns:p14="http://schemas.microsoft.com/office/powerpoint/2010/main" val="65936339"/>
       </p:ext>
     </p:extLst>
   </p:cSld>
@@ -876,23 +858,6 @@
           <a:bodyPr/>
           <a:lstStyle/>
           <a:p>
-            <a:pPr marL="0" marR="0" lvl="0" indent="0" algn="l" defTabSz="914400" rtl="0" eaLnBrk="1" fontAlgn="auto" latinLnBrk="0" hangingPunct="1">
-              <a:lnSpc>
-                <a:spcPct val="100000"/>
-              </a:lnSpc>
-              <a:spcBef>
-                <a:spcPts val="0"/>
-              </a:spcBef>
-              <a:spcAft>
-                <a:spcPts val="0"/>
-              </a:spcAft>
-              <a:buClrTx/>
-              <a:buSzTx/>
-              <a:buFontTx/>
-              <a:buNone/>
-              <a:tabLst/>
-              <a:defRPr/>
-            </a:pPr>
             <a:endParaRPr lang="en-US" dirty="0"/>
           </a:p>
         </p:txBody>
@@ -923,7 +888,7 @@
     </p:spTree>
     <p:extLst>
       <p:ext uri="{BB962C8B-B14F-4D97-AF65-F5344CB8AC3E}">
-        <p14:creationId xmlns:p14="http://schemas.microsoft.com/office/powerpoint/2010/main" val="1457669835"/>
+        <p14:creationId xmlns:p14="http://schemas.microsoft.com/office/powerpoint/2010/main" val="743261006"/>
       </p:ext>
     </p:extLst>
   </p:cSld>
@@ -1064,6 +1029,23 @@
           <a:bodyPr/>
           <a:lstStyle/>
           <a:p>
+            <a:pPr marL="0" marR="0" lvl="0" indent="0" algn="l" defTabSz="914400" rtl="0" eaLnBrk="1" fontAlgn="auto" latinLnBrk="0" hangingPunct="1">
+              <a:lnSpc>
+                <a:spcPct val="100000"/>
+              </a:lnSpc>
+              <a:spcBef>
+                <a:spcPts val="0"/>
+              </a:spcBef>
+              <a:spcAft>
+                <a:spcPts val="0"/>
+              </a:spcAft>
+              <a:buClrTx/>
+              <a:buSzTx/>
+              <a:buFontTx/>
+              <a:buNone/>
+              <a:tabLst/>
+              <a:defRPr/>
+            </a:pPr>
             <a:endParaRPr lang="en-US" dirty="0"/>
           </a:p>
         </p:txBody>
@@ -1094,7 +1076,7 @@
     </p:spTree>
     <p:extLst>
       <p:ext uri="{BB962C8B-B14F-4D97-AF65-F5344CB8AC3E}">
-        <p14:creationId xmlns:p14="http://schemas.microsoft.com/office/powerpoint/2010/main" val="65936339"/>
+        <p14:creationId xmlns:p14="http://schemas.microsoft.com/office/powerpoint/2010/main" val="1457669835"/>
       </p:ext>
     </p:extLst>
   </p:cSld>
@@ -1123,7 +1105,7 @@
       </p:grpSpPr>
       <p:sp>
         <p:nvSpPr>
-          <p:cNvPr id="2" name="Slide Image Placeholder 1"/>
+          <p:cNvPr id="2" name="Segnaposto immagine diapositiva 1"/>
           <p:cNvSpPr>
             <a:spLocks noGrp="1" noRot="1" noChangeAspect="1"/>
           </p:cNvSpPr>
@@ -1135,7 +1117,7 @@
       </p:sp>
       <p:sp>
         <p:nvSpPr>
-          <p:cNvPr id="3" name="Notes Placeholder 2"/>
+          <p:cNvPr id="3" name="Segnaposto note 2"/>
           <p:cNvSpPr>
             <a:spLocks noGrp="1"/>
           </p:cNvSpPr>
@@ -1148,13 +1130,13 @@
           <a:bodyPr/>
           <a:lstStyle/>
           <a:p>
-            <a:endParaRPr lang="en-US" dirty="0"/>
-          </a:p>
-        </p:txBody>
-      </p:sp>
-      <p:sp>
-        <p:nvSpPr>
-          <p:cNvPr id="4" name="Slide Number Placeholder 3"/>
+            <a:endParaRPr lang="it-IT" dirty="0"/>
+          </a:p>
+        </p:txBody>
+      </p:sp>
+      <p:sp>
+        <p:nvSpPr>
+          <p:cNvPr id="4" name="Segnaposto numero diapositiva 3"/>
           <p:cNvSpPr>
             <a:spLocks noGrp="1"/>
           </p:cNvSpPr>
@@ -1178,7 +1160,7 @@
     </p:spTree>
     <p:extLst>
       <p:ext uri="{BB962C8B-B14F-4D97-AF65-F5344CB8AC3E}">
-        <p14:creationId xmlns:p14="http://schemas.microsoft.com/office/powerpoint/2010/main" val="2570877332"/>
+        <p14:creationId xmlns:p14="http://schemas.microsoft.com/office/powerpoint/2010/main" val="3117379662"/>
       </p:ext>
     </p:extLst>
   </p:cSld>
@@ -1232,7 +1214,27 @@
           <a:bodyPr/>
           <a:lstStyle/>
           <a:p>
-            <a:endParaRPr lang="it-IT" dirty="0"/>
+            <a:pPr marL="0" marR="0" lvl="0" indent="0" algn="l" defTabSz="914400" rtl="0" eaLnBrk="1" fontAlgn="auto" latinLnBrk="0" hangingPunct="1">
+              <a:lnSpc>
+                <a:spcPct val="100000"/>
+              </a:lnSpc>
+              <a:spcBef>
+                <a:spcPts val="0"/>
+              </a:spcBef>
+              <a:spcAft>
+                <a:spcPts val="0"/>
+              </a:spcAft>
+              <a:buClrTx/>
+              <a:buSzTx/>
+              <a:buFontTx/>
+              <a:buNone/>
+              <a:tabLst/>
+              <a:defRPr/>
+            </a:pPr>
+            <a:endParaRPr lang="en-US" dirty="0">
+              <a:latin typeface="Calibri" panose="020F0502020204030204" pitchFamily="34" charset="0"/>
+              <a:cs typeface="Calibri" panose="020F0502020204030204" pitchFamily="34" charset="0"/>
+            </a:endParaRPr>
           </a:p>
         </p:txBody>
       </p:sp>
@@ -1253,7 +1255,7 @@
           <a:p>
             <a:fld id="{E5C51989-9A18-B94A-8794-50FDA8B77593}" type="slidenum">
               <a:rPr lang="en-US" smtClean="0"/>
-              <a:t>10</a:t>
+              <a:t>9</a:t>
             </a:fld>
             <a:endParaRPr lang="en-US"/>
           </a:p>
@@ -1262,7 +1264,7 @@
     </p:spTree>
     <p:extLst>
       <p:ext uri="{BB962C8B-B14F-4D97-AF65-F5344CB8AC3E}">
-        <p14:creationId xmlns:p14="http://schemas.microsoft.com/office/powerpoint/2010/main" val="814058651"/>
+        <p14:creationId xmlns:p14="http://schemas.microsoft.com/office/powerpoint/2010/main" val="3694539174"/>
       </p:ext>
     </p:extLst>
   </p:cSld>
@@ -1346,7 +1348,7 @@
     </p:spTree>
     <p:extLst>
       <p:ext uri="{BB962C8B-B14F-4D97-AF65-F5344CB8AC3E}">
-        <p14:creationId xmlns:p14="http://schemas.microsoft.com/office/powerpoint/2010/main" val="3117379662"/>
+        <p14:creationId xmlns:p14="http://schemas.microsoft.com/office/powerpoint/2010/main" val="814058651"/>
       </p:ext>
     </p:extLst>
   </p:cSld>
@@ -5937,7 +5939,9 @@
             <a:off x="838200" y="1825625"/>
             <a:ext cx="10791092" cy="4351339"/>
           </a:xfrm>
-          <a:noFill/>
+          <a:solidFill>
+            <a:srgbClr val="FFC000"/>
+          </a:solidFill>
         </p:spPr>
         <p:txBody>
           <a:bodyPr>
@@ -5947,7 +5951,7 @@
           <a:p>
             <a:r>
               <a:rPr lang="en-GB" dirty="0"/>
-              <a:t>Problem solving</a:t>
+              <a:t>Code-snippets fill-in &amp; comment</a:t>
             </a:r>
           </a:p>
           <a:p>
@@ -5957,24 +5961,137 @@
             <a:endParaRPr lang="en-GB" dirty="0"/>
           </a:p>
           <a:p>
-            <a:pPr lvl="1"/>
-            <a:r>
-              <a:rPr lang="en-GB" dirty="0"/>
-              <a:t>Given a particular data stream, describe which method, evaluation mode, concept drift detector and metric you would use and why, listing the expected results</a:t>
-            </a:r>
-          </a:p>
-          <a:p>
-            <a:pPr lvl="1"/>
-            <a:r>
-              <a:rPr lang="en-GB" dirty="0"/>
-              <a:t>Given a particular data stream, describe which concept drift detector you would use and why, listing the expected results</a:t>
-            </a:r>
-          </a:p>
-          <a:p>
             <a:pPr marL="0" indent="0">
               <a:buNone/>
             </a:pPr>
-            <a:endParaRPr lang="en-GB" dirty="0"/>
+            <a:r>
+              <a:rPr lang="en-GB" sz="2400" dirty="0"/>
+              <a:t>model = ……………………………………………………………</a:t>
+            </a:r>
+            <a:br>
+              <a:rPr lang="en-GB" sz="2400" dirty="0"/>
+            </a:br>
+            <a:r>
+              <a:rPr lang="en-GB" sz="2400" dirty="0"/>
+              <a:t>metric = …………………………………………………………… </a:t>
+            </a:r>
+            <a:br>
+              <a:rPr lang="en-GB" sz="2400" dirty="0"/>
+            </a:br>
+            <a:r>
+              <a:rPr lang="en-GB" sz="2400" dirty="0"/>
+              <a:t>stream = </a:t>
+            </a:r>
+            <a:r>
+              <a:rPr lang="en-GB" sz="2400" dirty="0" err="1"/>
+              <a:t>iter_pandas</a:t>
+            </a:r>
+            <a:r>
+              <a:rPr lang="en-GB" sz="2400" dirty="0"/>
+              <a:t>(X=data[features], y=data['class’])</a:t>
+            </a:r>
+            <a:br>
+              <a:rPr lang="en-GB" sz="2400" dirty="0"/>
+            </a:br>
+            <a:r>
+              <a:rPr lang="en-GB" sz="2400" dirty="0" err="1"/>
+              <a:t>progressive_val_score</a:t>
+            </a:r>
+            <a:r>
+              <a:rPr lang="en-GB" sz="2400" dirty="0"/>
+              <a:t>(…………………………………….,</a:t>
+            </a:r>
+            <a:br>
+              <a:rPr lang="en-GB" sz="2400" dirty="0"/>
+            </a:br>
+            <a:r>
+              <a:rPr lang="en-GB" sz="2400" dirty="0"/>
+              <a:t>		         …………………………………….,</a:t>
+            </a:r>
+            <a:br>
+              <a:rPr lang="en-GB" sz="2400" dirty="0"/>
+            </a:br>
+            <a:r>
+              <a:rPr lang="en-GB" sz="2400" dirty="0"/>
+              <a:t>		         …………………………………….,</a:t>
+            </a:r>
+            <a:br>
+              <a:rPr lang="en-GB" sz="2400" dirty="0"/>
+            </a:br>
+            <a:r>
+              <a:rPr lang="en-GB" sz="2400" dirty="0"/>
+              <a:t>		         </a:t>
+            </a:r>
+            <a:r>
+              <a:rPr lang="en-GB" sz="2400" dirty="0" err="1"/>
+              <a:t>print_every</a:t>
+            </a:r>
+            <a:r>
+              <a:rPr lang="en-GB" sz="2400" dirty="0"/>
+              <a:t>=1000)</a:t>
+            </a:r>
+          </a:p>
+          <a:p>
+            <a:pPr marL="0" indent="0">
+              <a:buNone/>
+            </a:pPr>
+            <a:endParaRPr lang="en-GB" sz="2000" dirty="0"/>
+          </a:p>
+          <a:p>
+            <a:pPr marL="0" indent="0">
+              <a:buNone/>
+            </a:pPr>
+            <a:r>
+              <a:rPr lang="en-GB" sz="2400" dirty="0">
+                <a:cs typeface="Calibri"/>
+              </a:rPr>
+              <a:t>For</a:t>
+            </a:r>
+            <a:r>
+              <a:rPr lang="en-GB" sz="2400" spc="-5" dirty="0">
+                <a:cs typeface="Calibri"/>
+              </a:rPr>
+              <a:t> </a:t>
+            </a:r>
+            <a:r>
+              <a:rPr lang="en-GB" sz="2400" dirty="0">
+                <a:cs typeface="Calibri"/>
+              </a:rPr>
+              <a:t>the</a:t>
+            </a:r>
+            <a:r>
+              <a:rPr lang="en-GB" sz="2400" spc="20" dirty="0">
+                <a:cs typeface="Calibri"/>
+              </a:rPr>
+              <a:t> </a:t>
+            </a:r>
+            <a:r>
+              <a:rPr lang="en-GB" sz="2400" dirty="0">
+                <a:cs typeface="Calibri"/>
+              </a:rPr>
+              <a:t>solution</a:t>
+            </a:r>
+            <a:r>
+              <a:rPr lang="en-GB" sz="2400" spc="5" dirty="0">
+                <a:cs typeface="Calibri"/>
+              </a:rPr>
+              <a:t> </a:t>
+            </a:r>
+            <a:r>
+              <a:rPr lang="en-GB" sz="2400" dirty="0">
+                <a:cs typeface="Calibri"/>
+              </a:rPr>
+              <a:t>see </a:t>
+            </a:r>
+            <a:r>
+              <a:rPr lang="en-GB" sz="2400" dirty="0" err="1">
+                <a:cs typeface="Calibri"/>
+              </a:rPr>
+              <a:t>Stream_Classification.ipynb</a:t>
+            </a:r>
+            <a:endParaRPr lang="en-GB" sz="2400" dirty="0">
+              <a:cs typeface="Calibri"/>
+            </a:endParaRPr>
           </a:p>
         </p:txBody>
       </p:sp>
@@ -6035,101 +6152,10 @@
           </a:p>
         </p:txBody>
       </p:sp>
-      <p:sp>
-        <p:nvSpPr>
-          <p:cNvPr id="5" name="CasellaDiTesto 4">
-            <a:extLst>
-              <a:ext uri="{FF2B5EF4-FFF2-40B4-BE49-F238E27FC236}">
-                <a16:creationId xmlns:a16="http://schemas.microsoft.com/office/drawing/2014/main" id="{DB95A5B5-1AE6-C741-BEF3-C5ED6AA4C3E9}"/>
-              </a:ext>
-            </a:extLst>
-          </p:cNvPr>
-          <p:cNvSpPr txBox="1"/>
-          <p:nvPr/>
-        </p:nvSpPr>
-        <p:spPr>
-          <a:xfrm>
-            <a:off x="838199" y="5767754"/>
-            <a:ext cx="10310447" cy="461665"/>
-          </a:xfrm>
-          <a:prstGeom prst="rect">
-            <a:avLst/>
-          </a:prstGeom>
-          <a:noFill/>
-        </p:spPr>
-        <p:txBody>
-          <a:bodyPr wrap="square">
-            <a:spAutoFit/>
-          </a:bodyPr>
-          <a:lstStyle/>
-          <a:p>
-            <a:pPr marL="0" indent="0">
-              <a:buNone/>
-            </a:pPr>
-            <a:r>
-              <a:rPr lang="it-IT" sz="2400" dirty="0">
-                <a:cs typeface="Calibri"/>
-              </a:rPr>
-              <a:t>For</a:t>
-            </a:r>
-            <a:r>
-              <a:rPr lang="it-IT" sz="2400" spc="-5" dirty="0">
-                <a:cs typeface="Calibri"/>
-              </a:rPr>
-              <a:t> a facsimile </a:t>
-            </a:r>
-            <a:r>
-              <a:rPr lang="it-IT" sz="2400" dirty="0">
-                <a:cs typeface="Calibri"/>
-              </a:rPr>
-              <a:t>solution</a:t>
-            </a:r>
-            <a:r>
-              <a:rPr lang="it-IT" sz="2400" spc="5" dirty="0">
-                <a:cs typeface="Calibri"/>
-              </a:rPr>
-              <a:t> </a:t>
-            </a:r>
-            <a:r>
-              <a:rPr lang="it-IT" sz="2400" dirty="0" err="1">
-                <a:cs typeface="Calibri"/>
-              </a:rPr>
-              <a:t>see</a:t>
-            </a:r>
-            <a:r>
-              <a:rPr lang="it-IT" sz="2400" dirty="0">
-                <a:cs typeface="Calibri"/>
-              </a:rPr>
-              <a:t> </a:t>
-            </a:r>
-            <a:r>
-              <a:rPr lang="en-GB" sz="2400" dirty="0" err="1">
-                <a:cs typeface="Calibri"/>
-              </a:rPr>
-              <a:t>Stream_Classification.ipynb</a:t>
-            </a:r>
-            <a:r>
-              <a:rPr lang="en-GB" sz="2400" dirty="0">
-                <a:cs typeface="Calibri"/>
-              </a:rPr>
-              <a:t> and </a:t>
-            </a:r>
-            <a:r>
-              <a:rPr lang="en-GB" sz="2400" dirty="0" err="1">
-                <a:cs typeface="Calibri"/>
-              </a:rPr>
-              <a:t>Concept_Drift.ipynb</a:t>
-            </a:r>
-            <a:endParaRPr lang="it-IT" sz="2400" dirty="0">
-              <a:cs typeface="Calibri"/>
-            </a:endParaRPr>
-          </a:p>
-        </p:txBody>
-      </p:sp>
     </p:spTree>
     <p:extLst>
       <p:ext uri="{BB962C8B-B14F-4D97-AF65-F5344CB8AC3E}">
-        <p14:creationId xmlns:p14="http://schemas.microsoft.com/office/powerpoint/2010/main" val="2947216780"/>
+        <p14:creationId xmlns:p14="http://schemas.microsoft.com/office/powerpoint/2010/main" val="1823437186"/>
       </p:ext>
     </p:extLst>
   </p:cSld>
@@ -6189,7 +6215,7 @@
             </a:r>
             <a:r>
               <a:rPr lang="en-GB" b="1" dirty="0"/>
-              <a:t>TSA</a:t>
+              <a:t>SML</a:t>
             </a:r>
             <a:endParaRPr lang="it-IT" b="1" dirty="0"/>
           </a:p>
@@ -6216,7 +6242,9 @@
             <a:off x="838200" y="1825625"/>
             <a:ext cx="10791092" cy="4351339"/>
           </a:xfrm>
-          <a:noFill/>
+          <a:solidFill>
+            <a:srgbClr val="FFC000"/>
+          </a:solidFill>
         </p:spPr>
         <p:txBody>
           <a:bodyPr>
@@ -6226,139 +6254,34 @@
           <a:p>
             <a:r>
               <a:rPr lang="en-GB" dirty="0"/>
-              <a:t>Code-snippets fill-in &amp; comment</a:t>
+              <a:t>Problem solving</a:t>
             </a:r>
           </a:p>
           <a:p>
             <a:pPr marL="0" indent="0">
               <a:buNone/>
             </a:pPr>
-            <a:endParaRPr lang="en-GB" sz="2400" dirty="0"/>
+            <a:endParaRPr lang="en-GB" dirty="0"/>
+          </a:p>
+          <a:p>
+            <a:pPr lvl="1"/>
+            <a:r>
+              <a:rPr lang="en-GB" dirty="0"/>
+              <a:t>Given a particular data stream, describe which method, evaluation mode, concept drift detector and metric you would use and why, listing the expected results</a:t>
+            </a:r>
+          </a:p>
+          <a:p>
+            <a:pPr lvl="1"/>
+            <a:r>
+              <a:rPr lang="en-GB" dirty="0"/>
+              <a:t>Given a particular data stream, describe which concept drift detector you would use and why, listing the expected results</a:t>
+            </a:r>
           </a:p>
           <a:p>
             <a:pPr marL="0" indent="0">
               <a:buNone/>
             </a:pPr>
-            <a:r>
-              <a:rPr lang="en-GB" sz="2200" dirty="0" err="1"/>
-              <a:t>mul_decomposition</a:t>
-            </a:r>
-            <a:r>
-              <a:rPr lang="en-GB" sz="2200" dirty="0"/>
-              <a:t> = </a:t>
-            </a:r>
-            <a:r>
-              <a:rPr lang="en-GB" sz="2200" dirty="0" err="1"/>
-              <a:t>sm.tsa.seasonal_decompose</a:t>
-            </a:r>
-            <a:r>
-              <a:rPr lang="en-GB" sz="2200" dirty="0"/>
-              <a:t>(……, ………)</a:t>
-            </a:r>
-          </a:p>
-          <a:p>
-            <a:pPr marL="0" indent="0">
-              <a:buNone/>
-            </a:pPr>
-            <a:r>
-              <a:rPr lang="en-GB" sz="2200" dirty="0"/>
-              <a:t>………………. # plot the multiplicative decomposition</a:t>
-            </a:r>
-          </a:p>
-          <a:p>
-            <a:pPr marL="0" indent="0">
-              <a:buNone/>
-            </a:pPr>
-            <a:endParaRPr lang="en-GB" sz="2200" dirty="0"/>
-          </a:p>
-          <a:p>
-            <a:pPr marL="0" indent="0">
-              <a:buNone/>
-            </a:pPr>
-            <a:r>
-              <a:rPr lang="en-GB" sz="2200" dirty="0" err="1"/>
-              <a:t>add_decomposition</a:t>
-            </a:r>
-            <a:r>
-              <a:rPr lang="en-GB" sz="2200" dirty="0"/>
-              <a:t> = </a:t>
-            </a:r>
-            <a:r>
-              <a:rPr lang="en-GB" sz="2200" dirty="0" err="1"/>
-              <a:t>sm.tsa.seasonal_decompose</a:t>
-            </a:r>
-            <a:r>
-              <a:rPr lang="en-GB" sz="2200" dirty="0"/>
-              <a:t>(……, ………)</a:t>
-            </a:r>
-          </a:p>
-          <a:p>
-            <a:pPr marL="0" indent="0">
-              <a:buNone/>
-            </a:pPr>
-            <a:r>
-              <a:rPr lang="en-GB" sz="2200" dirty="0"/>
-              <a:t>………………. # plot the additive decomposition</a:t>
-            </a:r>
-          </a:p>
-          <a:p>
-            <a:pPr marL="0" indent="0">
-              <a:buNone/>
-            </a:pPr>
-            <a:endParaRPr lang="en-GB" sz="2000" dirty="0"/>
-          </a:p>
-          <a:p>
-            <a:pPr marL="0" indent="0">
-              <a:buNone/>
-            </a:pPr>
-            <a:r>
-              <a:rPr lang="it-IT" sz="2400" dirty="0">
-                <a:cs typeface="Calibri"/>
-              </a:rPr>
-              <a:t>For</a:t>
-            </a:r>
-            <a:r>
-              <a:rPr lang="it-IT" sz="2400" spc="-5" dirty="0">
-                <a:cs typeface="Calibri"/>
-              </a:rPr>
-              <a:t> </a:t>
-            </a:r>
-            <a:r>
-              <a:rPr lang="it-IT" sz="2400" dirty="0">
-                <a:cs typeface="Calibri"/>
-              </a:rPr>
-              <a:t>the</a:t>
-            </a:r>
-            <a:r>
-              <a:rPr lang="it-IT" sz="2400" spc="20" dirty="0">
-                <a:cs typeface="Calibri"/>
-              </a:rPr>
-              <a:t> </a:t>
-            </a:r>
-            <a:r>
-              <a:rPr lang="it-IT" sz="2400" dirty="0">
-                <a:cs typeface="Calibri"/>
-              </a:rPr>
-              <a:t>solution</a:t>
-            </a:r>
-            <a:r>
-              <a:rPr lang="it-IT" sz="2400" spc="5" dirty="0">
-                <a:cs typeface="Calibri"/>
-              </a:rPr>
-              <a:t> </a:t>
-            </a:r>
-            <a:r>
-              <a:rPr lang="it-IT" sz="2400" dirty="0" err="1">
-                <a:cs typeface="Calibri"/>
-              </a:rPr>
-              <a:t>see</a:t>
-            </a:r>
-            <a:r>
-              <a:rPr lang="it-IT" sz="2400" dirty="0">
-                <a:cs typeface="Calibri"/>
-              </a:rPr>
-              <a:t> TSA_02_Decomposition.ipynb</a:t>
-            </a:r>
+            <a:endParaRPr lang="en-GB" dirty="0"/>
           </a:p>
         </p:txBody>
       </p:sp>
@@ -6419,10 +6342,101 @@
           </a:p>
         </p:txBody>
       </p:sp>
+      <p:sp>
+        <p:nvSpPr>
+          <p:cNvPr id="5" name="CasellaDiTesto 4">
+            <a:extLst>
+              <a:ext uri="{FF2B5EF4-FFF2-40B4-BE49-F238E27FC236}">
+                <a16:creationId xmlns:a16="http://schemas.microsoft.com/office/drawing/2014/main" id="{DB95A5B5-1AE6-C741-BEF3-C5ED6AA4C3E9}"/>
+              </a:ext>
+            </a:extLst>
+          </p:cNvPr>
+          <p:cNvSpPr txBox="1"/>
+          <p:nvPr/>
+        </p:nvSpPr>
+        <p:spPr>
+          <a:xfrm>
+            <a:off x="838199" y="5767754"/>
+            <a:ext cx="10310447" cy="461665"/>
+          </a:xfrm>
+          <a:prstGeom prst="rect">
+            <a:avLst/>
+          </a:prstGeom>
+          <a:noFill/>
+        </p:spPr>
+        <p:txBody>
+          <a:bodyPr wrap="square">
+            <a:spAutoFit/>
+          </a:bodyPr>
+          <a:lstStyle/>
+          <a:p>
+            <a:pPr marL="0" indent="0">
+              <a:buNone/>
+            </a:pPr>
+            <a:r>
+              <a:rPr lang="it-IT" sz="2400" dirty="0">
+                <a:cs typeface="Calibri"/>
+              </a:rPr>
+              <a:t>For</a:t>
+            </a:r>
+            <a:r>
+              <a:rPr lang="it-IT" sz="2400" spc="-5" dirty="0">
+                <a:cs typeface="Calibri"/>
+              </a:rPr>
+              <a:t> a facsimile </a:t>
+            </a:r>
+            <a:r>
+              <a:rPr lang="it-IT" sz="2400" dirty="0">
+                <a:cs typeface="Calibri"/>
+              </a:rPr>
+              <a:t>solution</a:t>
+            </a:r>
+            <a:r>
+              <a:rPr lang="it-IT" sz="2400" spc="5" dirty="0">
+                <a:cs typeface="Calibri"/>
+              </a:rPr>
+              <a:t> </a:t>
+            </a:r>
+            <a:r>
+              <a:rPr lang="it-IT" sz="2400" dirty="0" err="1">
+                <a:cs typeface="Calibri"/>
+              </a:rPr>
+              <a:t>see</a:t>
+            </a:r>
+            <a:r>
+              <a:rPr lang="it-IT" sz="2400" dirty="0">
+                <a:cs typeface="Calibri"/>
+              </a:rPr>
+              <a:t> </a:t>
+            </a:r>
+            <a:r>
+              <a:rPr lang="en-GB" sz="2400" dirty="0" err="1">
+                <a:cs typeface="Calibri"/>
+              </a:rPr>
+              <a:t>Stream_Classification.ipynb</a:t>
+            </a:r>
+            <a:r>
+              <a:rPr lang="en-GB" sz="2400" dirty="0">
+                <a:cs typeface="Calibri"/>
+              </a:rPr>
+              <a:t> and </a:t>
+            </a:r>
+            <a:r>
+              <a:rPr lang="en-GB" sz="2400" dirty="0" err="1">
+                <a:cs typeface="Calibri"/>
+              </a:rPr>
+              <a:t>Concept_Drift.ipynb</a:t>
+            </a:r>
+            <a:endParaRPr lang="it-IT" sz="2400" dirty="0">
+              <a:cs typeface="Calibri"/>
+            </a:endParaRPr>
+          </a:p>
+        </p:txBody>
+      </p:sp>
     </p:spTree>
     <p:extLst>
       <p:ext uri="{BB962C8B-B14F-4D97-AF65-F5344CB8AC3E}">
-        <p14:creationId xmlns:p14="http://schemas.microsoft.com/office/powerpoint/2010/main" val="3965805136"/>
+        <p14:creationId xmlns:p14="http://schemas.microsoft.com/office/powerpoint/2010/main" val="2947216780"/>
       </p:ext>
     </p:extLst>
   </p:cSld>
@@ -6451,10 +6465,10 @@
       </p:grpSpPr>
       <p:sp>
         <p:nvSpPr>
-          <p:cNvPr id="9" name="Title 8">
-            <a:extLst>
-              <a:ext uri="{FF2B5EF4-FFF2-40B4-BE49-F238E27FC236}">
-                <a16:creationId xmlns:a16="http://schemas.microsoft.com/office/drawing/2014/main" id="{885E2613-CFFE-8746-BB6F-5FF859931508}"/>
+          <p:cNvPr id="2" name="Title 1">
+            <a:extLst>
+              <a:ext uri="{FF2B5EF4-FFF2-40B4-BE49-F238E27FC236}">
+                <a16:creationId xmlns:a16="http://schemas.microsoft.com/office/drawing/2014/main" id="{3B526142-4C6D-1E75-2D5A-800EB2DDA85E}"/>
               </a:ext>
             </a:extLst>
           </p:cNvPr>
@@ -6467,33 +6481,66 @@
         </p:nvSpPr>
         <p:spPr/>
         <p:txBody>
-          <a:bodyPr>
-            <a:normAutofit/>
-          </a:bodyPr>
-          <a:lstStyle/>
-          <a:p>
-            <a:r>
-              <a:rPr lang="en-GB" b="1" dirty="0"/>
-              <a:t>Exercises</a:t>
-            </a:r>
-            <a:r>
-              <a:rPr lang="en-GB" dirty="0"/>
-              <a:t> on </a:t>
-            </a:r>
-            <a:r>
-              <a:rPr lang="en-GB" b="1" dirty="0"/>
-              <a:t>TSA</a:t>
-            </a:r>
-            <a:endParaRPr lang="it-IT" b="1" dirty="0"/>
-          </a:p>
-        </p:txBody>
-      </p:sp>
-      <p:sp>
-        <p:nvSpPr>
-          <p:cNvPr id="7" name="Footer Placeholder 6">
-            <a:extLst>
-              <a:ext uri="{FF2B5EF4-FFF2-40B4-BE49-F238E27FC236}">
-                <a16:creationId xmlns:a16="http://schemas.microsoft.com/office/drawing/2014/main" id="{0C5A1F71-D77F-5049-B6DB-FD7CA69ED1CE}"/>
+          <a:bodyPr/>
+          <a:lstStyle/>
+          <a:p>
+            <a:endParaRPr lang="en-US"/>
+          </a:p>
+        </p:txBody>
+      </p:sp>
+      <p:sp>
+        <p:nvSpPr>
+          <p:cNvPr id="3" name="Content Placeholder 2">
+            <a:extLst>
+              <a:ext uri="{FF2B5EF4-FFF2-40B4-BE49-F238E27FC236}">
+                <a16:creationId xmlns:a16="http://schemas.microsoft.com/office/drawing/2014/main" id="{0F8B82AC-A6B4-D81B-3F7B-D5F720D6A32E}"/>
+              </a:ext>
+            </a:extLst>
+          </p:cNvPr>
+          <p:cNvSpPr>
+            <a:spLocks noGrp="1"/>
+          </p:cNvSpPr>
+          <p:nvPr>
+            <p:ph idx="1"/>
+          </p:nvPr>
+        </p:nvSpPr>
+        <p:spPr/>
+        <p:txBody>
+          <a:bodyPr/>
+          <a:lstStyle/>
+          <a:p>
+            <a:r>
+              <a:rPr lang="en-US" dirty="0">
+                <a:highlight>
+                  <a:srgbClr val="FFFF00"/>
+                </a:highlight>
+                <a:latin typeface="Calibri" panose="020F0502020204030204" pitchFamily="34" charset="0"/>
+                <a:cs typeface="Calibri" panose="020F0502020204030204" pitchFamily="34" charset="0"/>
+              </a:rPr>
+              <a:t>Given the plot of data distribution, tell which kind of drift occurred and if it necessary to change the decision boundary.</a:t>
+            </a:r>
+          </a:p>
+          <a:p>
+            <a:r>
+              <a:rPr lang="en-US" dirty="0">
+                <a:highlight>
+                  <a:srgbClr val="FFFF00"/>
+                </a:highlight>
+                <a:latin typeface="Calibri" panose="020F0502020204030204" pitchFamily="34" charset="0"/>
+                <a:cs typeface="Calibri" panose="020F0502020204030204" pitchFamily="34" charset="0"/>
+              </a:rPr>
+              <a:t>Given the plot of the model performance, tell if there is a drift and if the model is able to adapt to it.</a:t>
+            </a:r>
+            <a:endParaRPr lang="en-US" dirty="0"/>
+          </a:p>
+        </p:txBody>
+      </p:sp>
+      <p:sp>
+        <p:nvSpPr>
+          <p:cNvPr id="4" name="Footer Placeholder 3">
+            <a:extLst>
+              <a:ext uri="{FF2B5EF4-FFF2-40B4-BE49-F238E27FC236}">
+                <a16:creationId xmlns:a16="http://schemas.microsoft.com/office/drawing/2014/main" id="{CFE1A7A5-27D3-BDB6-49FD-C9DE4F1279BD}"/>
               </a:ext>
             </a:extLst>
           </p:cNvPr>
@@ -6518,10 +6565,10 @@
       </p:sp>
       <p:sp>
         <p:nvSpPr>
-          <p:cNvPr id="8" name="Slide Number Placeholder 7">
-            <a:extLst>
-              <a:ext uri="{FF2B5EF4-FFF2-40B4-BE49-F238E27FC236}">
-                <a16:creationId xmlns:a16="http://schemas.microsoft.com/office/drawing/2014/main" id="{9316B443-3F82-BD42-92CF-B32FAD9B5193}"/>
+          <p:cNvPr id="5" name="Slide Number Placeholder 4">
+            <a:extLst>
+              <a:ext uri="{FF2B5EF4-FFF2-40B4-BE49-F238E27FC236}">
+                <a16:creationId xmlns:a16="http://schemas.microsoft.com/office/drawing/2014/main" id="{3E461A43-17DF-D335-0F6C-068DDBFD35A8}"/>
               </a:ext>
             </a:extLst>
           </p:cNvPr>
@@ -6545,12 +6592,83 @@
           </a:p>
         </p:txBody>
       </p:sp>
-      <p:sp>
-        <p:nvSpPr>
-          <p:cNvPr id="2" name="Content Placeholder 9">
-            <a:extLst>
-              <a:ext uri="{FF2B5EF4-FFF2-40B4-BE49-F238E27FC236}">
-                <a16:creationId xmlns:a16="http://schemas.microsoft.com/office/drawing/2014/main" id="{55645E1E-3978-DF03-62D4-FA1933095CFD}"/>
+    </p:spTree>
+    <p:extLst>
+      <p:ext uri="{BB962C8B-B14F-4D97-AF65-F5344CB8AC3E}">
+        <p14:creationId xmlns:p14="http://schemas.microsoft.com/office/powerpoint/2010/main" val="3958291745"/>
+      </p:ext>
+    </p:extLst>
+  </p:cSld>
+  <p:clrMapOvr>
+    <a:masterClrMapping/>
+  </p:clrMapOvr>
+</p:sld>
+</file>
+
+<file path=ppt/slides/slide13.xml><?xml version="1.0" encoding="utf-8"?>
+<p:sld xmlns:a="http://schemas.openxmlformats.org/drawingml/2006/main" xmlns:r="http://schemas.openxmlformats.org/officeDocument/2006/relationships" xmlns:p="http://schemas.openxmlformats.org/presentationml/2006/main">
+  <p:cSld>
+    <p:spTree>
+      <p:nvGrpSpPr>
+        <p:cNvPr id="1" name=""/>
+        <p:cNvGrpSpPr/>
+        <p:nvPr/>
+      </p:nvGrpSpPr>
+      <p:grpSpPr>
+        <a:xfrm>
+          <a:off x="0" y="0"/>
+          <a:ext cx="0" cy="0"/>
+          <a:chOff x="0" y="0"/>
+          <a:chExt cx="0" cy="0"/>
+        </a:xfrm>
+      </p:grpSpPr>
+      <p:sp>
+        <p:nvSpPr>
+          <p:cNvPr id="2" name="Title 1">
+            <a:extLst>
+              <a:ext uri="{FF2B5EF4-FFF2-40B4-BE49-F238E27FC236}">
+                <a16:creationId xmlns:a16="http://schemas.microsoft.com/office/drawing/2014/main" id="{A4A9B45C-2106-E075-04C7-1538BE53FCEC}"/>
+              </a:ext>
+            </a:extLst>
+          </p:cNvPr>
+          <p:cNvSpPr>
+            <a:spLocks noGrp="1"/>
+          </p:cNvSpPr>
+          <p:nvPr>
+            <p:ph type="title"/>
+          </p:nvPr>
+        </p:nvSpPr>
+        <p:spPr/>
+        <p:txBody>
+          <a:bodyPr/>
+          <a:lstStyle/>
+          <a:p>
+            <a:r>
+              <a:rPr lang="en-US" dirty="0"/>
+              <a:t>++ </a:t>
+            </a:r>
+            <a:r>
+              <a:rPr lang="en-US" dirty="0" err="1"/>
+              <a:t>esempio</a:t>
+            </a:r>
+            <a:r>
+              <a:rPr lang="en-US" dirty="0"/>
+              <a:t> </a:t>
+            </a:r>
+            <a:r>
+              <a:rPr lang="en-US" dirty="0" err="1"/>
+              <a:t>risolto</a:t>
+            </a:r>
+            <a:endParaRPr lang="en-US" dirty="0"/>
+          </a:p>
+        </p:txBody>
+      </p:sp>
+      <p:sp>
+        <p:nvSpPr>
+          <p:cNvPr id="3" name="Content Placeholder 2">
+            <a:extLst>
+              <a:ext uri="{FF2B5EF4-FFF2-40B4-BE49-F238E27FC236}">
+                <a16:creationId xmlns:a16="http://schemas.microsoft.com/office/drawing/2014/main" id="{D071ED54-26CE-8F30-BB73-7D78810AB25B}"/>
               </a:ext>
             </a:extLst>
           </p:cNvPr>
@@ -6562,73 +6680,192 @@
           </p:nvPr>
         </p:nvSpPr>
         <p:spPr>
-          <a:xfrm>
-            <a:off x="838200" y="1580328"/>
-            <a:ext cx="10891345" cy="4187426"/>
-          </a:xfrm>
-          <a:noFill/>
+          <a:solidFill>
+            <a:srgbClr val="FFC000"/>
+          </a:solidFill>
         </p:spPr>
         <p:txBody>
           <a:bodyPr>
-            <a:normAutofit fontScale="92500" lnSpcReduction="10000"/>
+            <a:normAutofit lnSpcReduction="10000"/>
           </a:bodyPr>
           <a:lstStyle/>
           <a:p>
             <a:r>
-              <a:rPr lang="en-GB" dirty="0"/>
-              <a:t>Problem solving</a:t>
-            </a:r>
-          </a:p>
-          <a:p>
-            <a:pPr lvl="1"/>
-            <a:r>
-              <a:rPr lang="en-GB" dirty="0"/>
-              <a:t>Given the following time series, describe which algorithms you would use and why, listing the expected results</a:t>
-            </a:r>
-          </a:p>
-          <a:p>
-            <a:pPr lvl="1"/>
-            <a:endParaRPr lang="en-GB" dirty="0"/>
-          </a:p>
-          <a:p>
-            <a:pPr lvl="1"/>
-            <a:endParaRPr lang="en-GB" dirty="0"/>
-          </a:p>
-          <a:p>
-            <a:pPr lvl="1"/>
-            <a:endParaRPr lang="en-GB" dirty="0"/>
-          </a:p>
-          <a:p>
-            <a:pPr lvl="1"/>
-            <a:endParaRPr lang="en-GB" dirty="0"/>
-          </a:p>
-          <a:p>
-            <a:pPr lvl="1"/>
-            <a:endParaRPr lang="en-GB" dirty="0"/>
-          </a:p>
-          <a:p>
-            <a:pPr lvl="1"/>
-            <a:endParaRPr lang="en-GB" dirty="0"/>
-          </a:p>
-          <a:p>
-            <a:pPr lvl="1"/>
-            <a:endParaRPr lang="en-GB" dirty="0"/>
-          </a:p>
-          <a:p>
-            <a:pPr lvl="1"/>
-            <a:r>
-              <a:rPr lang="en-GB" dirty="0"/>
-              <a:t>Given specific outputs from ACF and PACF plots, describe which order you would use for a SARIMA model, and what conclusion you would come to with the model diagnostic</a:t>
-            </a:r>
+              <a:rPr lang="en-US" dirty="0"/>
+              <a:t>Code con </a:t>
+            </a:r>
+            <a:r>
+              <a:rPr lang="en-US" dirty="0" err="1"/>
+              <a:t>fissato</a:t>
+            </a:r>
+            <a:r>
+              <a:rPr lang="en-US" dirty="0"/>
+              <a:t> un </a:t>
+            </a:r>
+            <a:r>
+              <a:rPr lang="en-US" dirty="0" err="1"/>
+              <a:t>algoritmo</a:t>
+            </a:r>
+            <a:r>
+              <a:rPr lang="en-US" dirty="0"/>
+              <a:t> </a:t>
+            </a:r>
+          </a:p>
+          <a:p>
+            <a:endParaRPr lang="en-US" dirty="0"/>
+          </a:p>
+          <a:p>
+            <a:endParaRPr lang="en-US" dirty="0"/>
+          </a:p>
+          <a:p>
+            <a:r>
+              <a:rPr lang="en-US" dirty="0"/>
+              <a:t>Error rate plot </a:t>
+            </a:r>
+          </a:p>
+          <a:p>
+            <a:r>
+              <a:rPr lang="en-US" dirty="0" err="1"/>
+              <a:t>Tabella</a:t>
+            </a:r>
+            <a:r>
+              <a:rPr lang="en-US" dirty="0"/>
+              <a:t> per </a:t>
+            </a:r>
+            <a:r>
+              <a:rPr lang="en-US" dirty="0" err="1"/>
+              <a:t>commentare</a:t>
+            </a:r>
+            <a:r>
+              <a:rPr lang="en-US" dirty="0"/>
+              <a:t> il </a:t>
+            </a:r>
+            <a:r>
+              <a:rPr lang="en-US" dirty="0" err="1"/>
+              <a:t>codice</a:t>
+            </a:r>
+            <a:r>
+              <a:rPr lang="en-US" dirty="0"/>
+              <a:t> </a:t>
+            </a:r>
+          </a:p>
+          <a:p>
+            <a:r>
+              <a:rPr lang="en-US" dirty="0"/>
+              <a:t>Discuss the ability of the proposed code to address the concept drift illustrated in the two distribution plots and the error rate illustrated in the line plot </a:t>
+            </a:r>
+          </a:p>
+          <a:p>
+            <a:r>
+              <a:rPr lang="en-US" dirty="0"/>
+              <a:t>How would you </a:t>
+            </a:r>
+            <a:r>
+              <a:rPr lang="en-US" dirty="0" err="1"/>
+              <a:t>modifiy</a:t>
+            </a:r>
+            <a:r>
+              <a:rPr lang="en-US" dirty="0"/>
+              <a:t> the code to obtain (</a:t>
+            </a:r>
+            <a:r>
+              <a:rPr lang="en-US" dirty="0" err="1"/>
+              <a:t>situazione</a:t>
+            </a:r>
+            <a:r>
+              <a:rPr lang="en-US" dirty="0"/>
+              <a:t> </a:t>
+            </a:r>
+            <a:r>
+              <a:rPr lang="en-US" dirty="0" err="1"/>
+              <a:t>opposta</a:t>
+            </a:r>
+            <a:r>
+              <a:rPr lang="en-US" dirty="0"/>
+              <a:t> a </a:t>
+            </a:r>
+            <a:r>
+              <a:rPr lang="en-US" dirty="0" err="1"/>
+              <a:t>quella</a:t>
+            </a:r>
+            <a:r>
+              <a:rPr lang="en-US" dirty="0"/>
+              <a:t> </a:t>
+            </a:r>
+            <a:r>
+              <a:rPr lang="en-US" dirty="0" err="1"/>
+              <a:t>illustrata</a:t>
+            </a:r>
+            <a:r>
+              <a:rPr lang="en-US" dirty="0"/>
+              <a:t>) </a:t>
+            </a:r>
+          </a:p>
+        </p:txBody>
+      </p:sp>
+      <p:sp>
+        <p:nvSpPr>
+          <p:cNvPr id="4" name="Footer Placeholder 3">
+            <a:extLst>
+              <a:ext uri="{FF2B5EF4-FFF2-40B4-BE49-F238E27FC236}">
+                <a16:creationId xmlns:a16="http://schemas.microsoft.com/office/drawing/2014/main" id="{E1848AF6-9C89-63EA-1063-35AA1CEC61B3}"/>
+              </a:ext>
+            </a:extLst>
+          </p:cNvPr>
+          <p:cNvSpPr>
+            <a:spLocks noGrp="1"/>
+          </p:cNvSpPr>
+          <p:nvPr>
+            <p:ph type="ftr" sz="quarter" idx="11"/>
+          </p:nvPr>
+        </p:nvSpPr>
+        <p:spPr/>
+        <p:txBody>
+          <a:bodyPr/>
+          <a:lstStyle/>
+          <a:p>
+            <a:r>
+              <a:rPr lang="en-US"/>
+              <a:t>Emanuele Della Valle - http://emanueledellavalle.org</a:t>
+            </a:r>
+          </a:p>
+        </p:txBody>
+      </p:sp>
+      <p:sp>
+        <p:nvSpPr>
+          <p:cNvPr id="5" name="Slide Number Placeholder 4">
+            <a:extLst>
+              <a:ext uri="{FF2B5EF4-FFF2-40B4-BE49-F238E27FC236}">
+                <a16:creationId xmlns:a16="http://schemas.microsoft.com/office/drawing/2014/main" id="{C7AA81FB-6465-87D4-3D62-BF095E0A0EEA}"/>
+              </a:ext>
+            </a:extLst>
+          </p:cNvPr>
+          <p:cNvSpPr>
+            <a:spLocks noGrp="1"/>
+          </p:cNvSpPr>
+          <p:nvPr>
+            <p:ph type="sldNum" sz="quarter" idx="12"/>
+          </p:nvPr>
+        </p:nvSpPr>
+        <p:spPr/>
+        <p:txBody>
+          <a:bodyPr/>
+          <a:lstStyle/>
+          <a:p>
+            <a:fld id="{463394A2-5689-C845-95DB-27F089FB77B0}" type="slidenum">
+              <a:rPr lang="en-US" smtClean="0"/>
+              <a:t>13</a:t>
+            </a:fld>
+            <a:endParaRPr lang="en-US"/>
           </a:p>
         </p:txBody>
       </p:sp>
       <p:pic>
         <p:nvPicPr>
-          <p:cNvPr id="1026" name="Picture 2">
-            <a:extLst>
-              <a:ext uri="{FF2B5EF4-FFF2-40B4-BE49-F238E27FC236}">
-                <a16:creationId xmlns:a16="http://schemas.microsoft.com/office/drawing/2014/main" id="{7060E517-C15D-F9FE-C9B8-5BF0642CF23D}"/>
+          <p:cNvPr id="1028" name="Picture 4">
+            <a:extLst>
+              <a:ext uri="{FF2B5EF4-FFF2-40B4-BE49-F238E27FC236}">
+                <a16:creationId xmlns:a16="http://schemas.microsoft.com/office/drawing/2014/main" id="{4DC0ECEA-3A59-0ABB-742C-3FD0482C644B}"/>
               </a:ext>
             </a:extLst>
           </p:cNvPr>
@@ -6638,7 +6875,7 @@
           <p:nvPr/>
         </p:nvPicPr>
         <p:blipFill>
-          <a:blip r:embed="rId3">
+          <a:blip r:embed="rId2">
             <a:extLst>
               <a:ext uri="{28A0092B-C50C-407E-A947-70E740481C1C}">
                 <a14:useLocalDpi xmlns:a14="http://schemas.microsoft.com/office/drawing/2010/main" val="0"/>
@@ -6652,8 +6889,8 @@
         </p:blipFill>
         <p:spPr bwMode="auto">
           <a:xfrm>
-            <a:off x="4579554" y="2669731"/>
-            <a:ext cx="3032891" cy="2118980"/>
+            <a:off x="1116701" y="2292089"/>
+            <a:ext cx="1836892" cy="853251"/>
           </a:xfrm>
           <a:prstGeom prst="rect">
             <a:avLst/>
@@ -6670,92 +6907,10 @@
           </a:extLst>
         </p:spPr>
       </p:pic>
-      <p:sp>
-        <p:nvSpPr>
-          <p:cNvPr id="4" name="CasellaDiTesto 3">
-            <a:extLst>
-              <a:ext uri="{FF2B5EF4-FFF2-40B4-BE49-F238E27FC236}">
-                <a16:creationId xmlns:a16="http://schemas.microsoft.com/office/drawing/2014/main" id="{50B62FD4-3491-4A74-8F56-C9ADAB8BD3F2}"/>
-              </a:ext>
-            </a:extLst>
-          </p:cNvPr>
-          <p:cNvSpPr txBox="1"/>
-          <p:nvPr/>
-        </p:nvSpPr>
-        <p:spPr>
-          <a:xfrm>
-            <a:off x="838199" y="5767754"/>
-            <a:ext cx="10891345" cy="461665"/>
-          </a:xfrm>
-          <a:prstGeom prst="rect">
-            <a:avLst/>
-          </a:prstGeom>
-          <a:noFill/>
-        </p:spPr>
-        <p:txBody>
-          <a:bodyPr wrap="square">
-            <a:spAutoFit/>
-          </a:bodyPr>
-          <a:lstStyle/>
-          <a:p>
-            <a:pPr marL="0" indent="0">
-              <a:buNone/>
-            </a:pPr>
-            <a:r>
-              <a:rPr lang="it-IT" sz="2400" dirty="0">
-                <a:cs typeface="Calibri"/>
-              </a:rPr>
-              <a:t>For</a:t>
-            </a:r>
-            <a:r>
-              <a:rPr lang="it-IT" sz="2400" spc="-5" dirty="0">
-                <a:cs typeface="Calibri"/>
-              </a:rPr>
-              <a:t> </a:t>
-            </a:r>
-            <a:r>
-              <a:rPr lang="it-IT" sz="2400" dirty="0">
-                <a:cs typeface="Calibri"/>
-              </a:rPr>
-              <a:t>a facsimile</a:t>
-            </a:r>
-            <a:r>
-              <a:rPr lang="it-IT" sz="2400" spc="20" dirty="0">
-                <a:cs typeface="Calibri"/>
-              </a:rPr>
-              <a:t> </a:t>
-            </a:r>
-            <a:r>
-              <a:rPr lang="it-IT" sz="2400" dirty="0">
-                <a:cs typeface="Calibri"/>
-              </a:rPr>
-              <a:t>solution</a:t>
-            </a:r>
-            <a:r>
-              <a:rPr lang="it-IT" sz="2400" spc="5" dirty="0">
-                <a:cs typeface="Calibri"/>
-              </a:rPr>
-              <a:t> </a:t>
-            </a:r>
-            <a:r>
-              <a:rPr lang="it-IT" sz="2400" dirty="0" err="1">
-                <a:cs typeface="Calibri"/>
-              </a:rPr>
-              <a:t>see</a:t>
-            </a:r>
-            <a:r>
-              <a:rPr lang="it-IT" sz="2400" dirty="0">
-                <a:cs typeface="Calibri"/>
-              </a:rPr>
-              <a:t> TSA_09_SARIMA.ipynb and TSA_06_Forecasting_Sol.ipynb </a:t>
-            </a:r>
-          </a:p>
-        </p:txBody>
-      </p:sp>
     </p:spTree>
     <p:extLst>
       <p:ext uri="{BB962C8B-B14F-4D97-AF65-F5344CB8AC3E}">
-        <p14:creationId xmlns:p14="http://schemas.microsoft.com/office/powerpoint/2010/main" val="3410039972"/>
+        <p14:creationId xmlns:p14="http://schemas.microsoft.com/office/powerpoint/2010/main" val="1576299182"/>
       </p:ext>
     </p:extLst>
   </p:cSld>
@@ -6765,7 +6920,331 @@
 </p:sld>
 </file>
 
-<file path=ppt/slides/slide13.xml><?xml version="1.0" encoding="utf-8"?>
+<file path=ppt/slides/slide14.xml><?xml version="1.0" encoding="utf-8"?>
+<p:sld xmlns:a="http://schemas.openxmlformats.org/drawingml/2006/main" xmlns:r="http://schemas.openxmlformats.org/officeDocument/2006/relationships" xmlns:p="http://schemas.openxmlformats.org/presentationml/2006/main">
+  <p:cSld>
+    <p:spTree>
+      <p:nvGrpSpPr>
+        <p:cNvPr id="1" name=""/>
+        <p:cNvGrpSpPr/>
+        <p:nvPr/>
+      </p:nvGrpSpPr>
+      <p:grpSpPr>
+        <a:xfrm>
+          <a:off x="0" y="0"/>
+          <a:ext cx="0" cy="0"/>
+          <a:chOff x="0" y="0"/>
+          <a:chExt cx="0" cy="0"/>
+        </a:xfrm>
+      </p:grpSpPr>
+      <p:sp>
+        <p:nvSpPr>
+          <p:cNvPr id="9" name="Title 8">
+            <a:extLst>
+              <a:ext uri="{FF2B5EF4-FFF2-40B4-BE49-F238E27FC236}">
+                <a16:creationId xmlns:a16="http://schemas.microsoft.com/office/drawing/2014/main" id="{885E2613-CFFE-8746-BB6F-5FF859931508}"/>
+              </a:ext>
+            </a:extLst>
+          </p:cNvPr>
+          <p:cNvSpPr>
+            <a:spLocks noGrp="1"/>
+          </p:cNvSpPr>
+          <p:nvPr>
+            <p:ph type="title"/>
+          </p:nvPr>
+        </p:nvSpPr>
+        <p:spPr>
+          <a:xfrm>
+            <a:off x="838200" y="365125"/>
+            <a:ext cx="11102788" cy="1325563"/>
+          </a:xfrm>
+        </p:spPr>
+        <p:txBody>
+          <a:bodyPr>
+            <a:normAutofit/>
+          </a:bodyPr>
+          <a:lstStyle/>
+          <a:p>
+            <a:r>
+              <a:rPr lang="en-GB" b="1" dirty="0"/>
+              <a:t>Exercises</a:t>
+            </a:r>
+            <a:r>
+              <a:rPr lang="en-GB" dirty="0"/>
+              <a:t> on </a:t>
+            </a:r>
+            <a:r>
+              <a:rPr lang="en-GB" b="1" dirty="0"/>
+              <a:t>TSA </a:t>
+            </a:r>
+            <a:endParaRPr lang="it-IT" dirty="0"/>
+          </a:p>
+        </p:txBody>
+      </p:sp>
+      <p:sp>
+        <p:nvSpPr>
+          <p:cNvPr id="7" name="Footer Placeholder 6">
+            <a:extLst>
+              <a:ext uri="{FF2B5EF4-FFF2-40B4-BE49-F238E27FC236}">
+                <a16:creationId xmlns:a16="http://schemas.microsoft.com/office/drawing/2014/main" id="{0C5A1F71-D77F-5049-B6DB-FD7CA69ED1CE}"/>
+              </a:ext>
+            </a:extLst>
+          </p:cNvPr>
+          <p:cNvSpPr>
+            <a:spLocks noGrp="1"/>
+          </p:cNvSpPr>
+          <p:nvPr>
+            <p:ph type="ftr" sz="quarter" idx="11"/>
+          </p:nvPr>
+        </p:nvSpPr>
+        <p:spPr/>
+        <p:txBody>
+          <a:bodyPr/>
+          <a:lstStyle/>
+          <a:p>
+            <a:r>
+              <a:rPr lang="en-US"/>
+              <a:t>Emanuele Della Valle - http://emanueledellavalle.org</a:t>
+            </a:r>
+          </a:p>
+        </p:txBody>
+      </p:sp>
+      <p:sp>
+        <p:nvSpPr>
+          <p:cNvPr id="8" name="Slide Number Placeholder 7">
+            <a:extLst>
+              <a:ext uri="{FF2B5EF4-FFF2-40B4-BE49-F238E27FC236}">
+                <a16:creationId xmlns:a16="http://schemas.microsoft.com/office/drawing/2014/main" id="{9316B443-3F82-BD42-92CF-B32FAD9B5193}"/>
+              </a:ext>
+            </a:extLst>
+          </p:cNvPr>
+          <p:cNvSpPr>
+            <a:spLocks noGrp="1"/>
+          </p:cNvSpPr>
+          <p:nvPr>
+            <p:ph type="sldNum" sz="quarter" idx="12"/>
+          </p:nvPr>
+        </p:nvSpPr>
+        <p:spPr/>
+        <p:txBody>
+          <a:bodyPr/>
+          <a:lstStyle/>
+          <a:p>
+            <a:fld id="{463394A2-5689-C845-95DB-27F089FB77B0}" type="slidenum">
+              <a:rPr lang="en-US" smtClean="0"/>
+              <a:t>14</a:t>
+            </a:fld>
+            <a:endParaRPr lang="en-US"/>
+          </a:p>
+        </p:txBody>
+      </p:sp>
+      <p:pic>
+        <p:nvPicPr>
+          <p:cNvPr id="3" name="Immagine 2">
+            <a:extLst>
+              <a:ext uri="{FF2B5EF4-FFF2-40B4-BE49-F238E27FC236}">
+                <a16:creationId xmlns:a16="http://schemas.microsoft.com/office/drawing/2014/main" id="{AF537E5F-FBA8-9999-5BCB-B18603E34A41}"/>
+              </a:ext>
+            </a:extLst>
+          </p:cNvPr>
+          <p:cNvPicPr>
+            <a:picLocks noChangeAspect="1"/>
+          </p:cNvPicPr>
+          <p:nvPr/>
+        </p:nvPicPr>
+        <p:blipFill>
+          <a:blip r:embed="rId3"/>
+          <a:stretch>
+            <a:fillRect/>
+          </a:stretch>
+        </p:blipFill>
+        <p:spPr>
+          <a:xfrm>
+            <a:off x="3944301" y="2598175"/>
+            <a:ext cx="4303397" cy="2841866"/>
+          </a:xfrm>
+          <a:prstGeom prst="rect">
+            <a:avLst/>
+          </a:prstGeom>
+        </p:spPr>
+      </p:pic>
+      <p:sp>
+        <p:nvSpPr>
+          <p:cNvPr id="10" name="CasellaDiTesto 9">
+            <a:extLst>
+              <a:ext uri="{FF2B5EF4-FFF2-40B4-BE49-F238E27FC236}">
+                <a16:creationId xmlns:a16="http://schemas.microsoft.com/office/drawing/2014/main" id="{CA3D1101-8AB6-E436-8043-632F19C6F9C6}"/>
+              </a:ext>
+            </a:extLst>
+          </p:cNvPr>
+          <p:cNvSpPr txBox="1"/>
+          <p:nvPr/>
+        </p:nvSpPr>
+        <p:spPr>
+          <a:xfrm>
+            <a:off x="838200" y="1630382"/>
+            <a:ext cx="10515600" cy="892552"/>
+          </a:xfrm>
+          <a:prstGeom prst="rect">
+            <a:avLst/>
+          </a:prstGeom>
+          <a:solidFill>
+            <a:srgbClr val="FFC000"/>
+          </a:solidFill>
+        </p:spPr>
+        <p:txBody>
+          <a:bodyPr wrap="square">
+            <a:spAutoFit/>
+          </a:bodyPr>
+          <a:lstStyle/>
+          <a:p>
+            <a:pPr algn="l"/>
+            <a:r>
+              <a:rPr lang="en-GB" sz="2600" dirty="0">
+                <a:solidFill>
+                  <a:srgbClr val="242424"/>
+                </a:solidFill>
+              </a:rPr>
+              <a:t>???Tipo di </a:t>
+            </a:r>
+            <a:r>
+              <a:rPr lang="en-GB" sz="2600" dirty="0" err="1">
+                <a:solidFill>
+                  <a:srgbClr val="242424"/>
+                </a:solidFill>
+              </a:rPr>
+              <a:t>problema</a:t>
+            </a:r>
+            <a:r>
+              <a:rPr lang="en-GB" sz="2600" dirty="0">
+                <a:solidFill>
+                  <a:srgbClr val="242424"/>
+                </a:solidFill>
+              </a:rPr>
+              <a:t>???? Given the following plot showing the performance of a Continual Learning model, d</a:t>
+            </a:r>
+            <a:r>
+              <a:rPr lang="en-GB" sz="2600" b="0" i="0" dirty="0">
+                <a:solidFill>
+                  <a:srgbClr val="242424"/>
+                </a:solidFill>
+                <a:effectLst/>
+              </a:rPr>
+              <a:t>escribes the learning </a:t>
+            </a:r>
+            <a:r>
+              <a:rPr lang="en-GB" sz="2600" dirty="0">
+                <a:solidFill>
+                  <a:srgbClr val="242424"/>
+                </a:solidFill>
+              </a:rPr>
+              <a:t>abilities of the model.</a:t>
+            </a:r>
+            <a:endParaRPr lang="en-GB" sz="2600" b="0" i="0" dirty="0">
+              <a:solidFill>
+                <a:srgbClr val="242424"/>
+              </a:solidFill>
+              <a:effectLst/>
+            </a:endParaRPr>
+          </a:p>
+        </p:txBody>
+      </p:sp>
+      <p:sp>
+        <p:nvSpPr>
+          <p:cNvPr id="4" name="CasellaDiTesto 3">
+            <a:extLst>
+              <a:ext uri="{FF2B5EF4-FFF2-40B4-BE49-F238E27FC236}">
+                <a16:creationId xmlns:a16="http://schemas.microsoft.com/office/drawing/2014/main" id="{E5C116AD-5B62-5B21-F3A9-17B6E0E0B4F9}"/>
+              </a:ext>
+            </a:extLst>
+          </p:cNvPr>
+          <p:cNvSpPr txBox="1"/>
+          <p:nvPr/>
+        </p:nvSpPr>
+        <p:spPr>
+          <a:xfrm>
+            <a:off x="838200" y="5550985"/>
+            <a:ext cx="6934200" cy="892552"/>
+          </a:xfrm>
+          <a:prstGeom prst="rect">
+            <a:avLst/>
+          </a:prstGeom>
+          <a:solidFill>
+            <a:srgbClr val="FFC000"/>
+          </a:solidFill>
+        </p:spPr>
+        <p:txBody>
+          <a:bodyPr wrap="square">
+            <a:spAutoFit/>
+          </a:bodyPr>
+          <a:lstStyle/>
+          <a:p>
+            <a:r>
+              <a:rPr lang="en-GB" sz="2600" dirty="0">
+                <a:cs typeface="Calibri"/>
+              </a:rPr>
+              <a:t>For</a:t>
+            </a:r>
+            <a:r>
+              <a:rPr lang="en-GB" sz="2600" spc="-5" dirty="0">
+                <a:cs typeface="Calibri"/>
+              </a:rPr>
+              <a:t> </a:t>
+            </a:r>
+            <a:r>
+              <a:rPr lang="en-GB" sz="2600" dirty="0">
+                <a:cs typeface="Calibri"/>
+              </a:rPr>
+              <a:t>the</a:t>
+            </a:r>
+            <a:r>
+              <a:rPr lang="en-GB" sz="2600" spc="20" dirty="0">
+                <a:cs typeface="Calibri"/>
+              </a:rPr>
+              <a:t> </a:t>
+            </a:r>
+            <a:r>
+              <a:rPr lang="en-GB" sz="2600" dirty="0">
+                <a:cs typeface="Calibri"/>
+              </a:rPr>
+              <a:t>solution</a:t>
+            </a:r>
+            <a:r>
+              <a:rPr lang="en-GB" sz="2600" spc="5" dirty="0">
+                <a:cs typeface="Calibri"/>
+              </a:rPr>
+              <a:t> </a:t>
+            </a:r>
+            <a:r>
+              <a:rPr lang="en-GB" sz="2600" dirty="0">
+                <a:cs typeface="Calibri"/>
+              </a:rPr>
+              <a:t>see slides 9-11 of 10_1_CL.pdf and </a:t>
+            </a:r>
+            <a:r>
+              <a:rPr lang="en-GB" sz="2600" dirty="0" err="1">
+                <a:cs typeface="Calibri"/>
+              </a:rPr>
+              <a:t>intro_to_CL.ipynb</a:t>
+            </a:r>
+            <a:endParaRPr lang="en-GB" sz="2600" dirty="0"/>
+          </a:p>
+        </p:txBody>
+      </p:sp>
+    </p:spTree>
+    <p:extLst>
+      <p:ext uri="{BB962C8B-B14F-4D97-AF65-F5344CB8AC3E}">
+        <p14:creationId xmlns:p14="http://schemas.microsoft.com/office/powerpoint/2010/main" val="804360266"/>
+      </p:ext>
+    </p:extLst>
+  </p:cSld>
+  <p:clrMapOvr>
+    <a:masterClrMapping/>
+  </p:clrMapOvr>
+</p:sld>
+</file>
+
+<file path=ppt/slides/slide15.xml><?xml version="1.0" encoding="utf-8"?>
 <p:sld xmlns:a="http://schemas.openxmlformats.org/drawingml/2006/main" xmlns:r="http://schemas.openxmlformats.org/officeDocument/2006/relationships" xmlns:p="http://schemas.openxmlformats.org/presentationml/2006/main">
   <p:cSld>
     <p:spTree>
@@ -7133,7 +7612,7 @@
             </a:pPr>
             <a:r>
               <a:rPr lang="en-GB" dirty="0"/>
-              <a:t>(8 points)</a:t>
+              <a:t>(6 points)</a:t>
             </a:r>
           </a:p>
           <a:p>
@@ -7608,7 +8087,7 @@
             </a:pPr>
             <a:r>
               <a:rPr lang="en-GB" dirty="0"/>
-              <a:t>(7 points)</a:t>
+              <a:t>(9 points)</a:t>
             </a:r>
           </a:p>
         </p:txBody>
@@ -7814,8 +8293,8 @@
         </p:nvSpPr>
         <p:spPr>
           <a:xfrm>
-            <a:off x="838200" y="365125"/>
-            <a:ext cx="11196918" cy="1325563"/>
+            <a:off x="838199" y="365125"/>
+            <a:ext cx="11353801" cy="1325563"/>
           </a:xfrm>
         </p:spPr>
         <p:txBody>
@@ -7825,27 +8304,35 @@
           <a:lstStyle/>
           <a:p>
             <a:r>
-              <a:rPr lang="it-IT" b="1" dirty="0" err="1"/>
+              <a:rPr lang="it-IT" sz="4000" b="1" dirty="0" err="1"/>
               <a:t>Questions</a:t>
             </a:r>
             <a:r>
-              <a:rPr lang="it-IT" dirty="0"/>
+              <a:rPr lang="it-IT" sz="4000" dirty="0"/>
               <a:t> to test the </a:t>
             </a:r>
             <a:r>
-              <a:rPr lang="it-IT" b="1" dirty="0" err="1"/>
+              <a:rPr lang="it-IT" sz="4000" b="1" dirty="0" err="1"/>
               <a:t>breadth</a:t>
             </a:r>
             <a:r>
-              <a:rPr lang="it-IT" dirty="0"/>
+              <a:rPr lang="it-IT" sz="4000" dirty="0"/>
               <a:t> of </a:t>
             </a:r>
             <a:r>
-              <a:rPr lang="it-IT" dirty="0" err="1"/>
+              <a:rPr lang="it-IT" sz="4000" dirty="0" err="1"/>
               <a:t>your</a:t>
             </a:r>
             <a:r>
-              <a:rPr lang="it-IT" dirty="0"/>
+              <a:rPr lang="it-IT" sz="4000" dirty="0"/>
+              <a:t> </a:t>
+            </a:r>
+            <a:r>
+              <a:rPr lang="it-IT" sz="4000" b="1" dirty="0"/>
+              <a:t>TSA</a:t>
+            </a:r>
+            <a:r>
+              <a:rPr lang="it-IT" sz="4000" dirty="0"/>
               <a:t> knowledge</a:t>
             </a:r>
           </a:p>
@@ -7869,54 +8356,97 @@
         </p:nvSpPr>
         <p:spPr>
           <a:xfrm>
-            <a:off x="838200" y="1825625"/>
-            <a:ext cx="10791092" cy="4351339"/>
+            <a:off x="838199" y="1627626"/>
+            <a:ext cx="10791092" cy="4665663"/>
           </a:xfrm>
           <a:noFill/>
         </p:spPr>
         <p:txBody>
           <a:bodyPr>
-            <a:normAutofit/>
+            <a:normAutofit fontScale="85000" lnSpcReduction="10000"/>
           </a:bodyPr>
           <a:lstStyle/>
           <a:p>
             <a:r>
-              <a:rPr lang="en-GB" dirty="0"/>
-              <a:t>Which are the differences between batch-oriented Machine Learning and Streaming Machine Learning?</a:t>
-            </a:r>
-          </a:p>
-          <a:p>
-            <a:r>
-              <a:rPr lang="en-GB" dirty="0"/>
-              <a:t>Which are the benefits and the challenges of Streaming Machine Learning?</a:t>
-            </a:r>
-          </a:p>
-          <a:p>
-            <a:r>
-              <a:rPr lang="en-GB" dirty="0"/>
-              <a:t>What is a concept drift? Which are the types of concept drift? What about the drift speed? Why is it so important to detect it?</a:t>
-            </a:r>
-          </a:p>
-          <a:p>
-            <a:r>
-              <a:rPr lang="en-GB" dirty="0"/>
-              <a:t>Which are the typical Streaming Machine Learning algorithms for classification? Illustrate one of them in detail.</a:t>
-            </a:r>
-          </a:p>
-          <a:p>
-            <a:r>
-              <a:rPr lang="en-GB" dirty="0"/>
-              <a:t>Which are the components of an SML Ensemble Classification model?</a:t>
-            </a:r>
+              <a:rPr lang="en-GB" sz="2600" dirty="0"/>
+              <a:t>What is the </a:t>
+            </a:r>
+            <a:r>
+              <a:rPr lang="en-GB" sz="2600" dirty="0" err="1"/>
+              <a:t>i.i.d.</a:t>
+            </a:r>
+            <a:r>
+              <a:rPr lang="en-GB" sz="2600" dirty="0"/>
+              <a:t> assumption? How do SML and TSA allow the loosening of part of it?</a:t>
+            </a:r>
+          </a:p>
+          <a:p>
+            <a:r>
+              <a:rPr lang="en-GB" sz="2600" dirty="0"/>
+              <a:t>Which characteristics can a non-stationary time series have? Illustrate it with an example.</a:t>
+            </a:r>
+          </a:p>
+          <a:p>
+            <a:r>
+              <a:rPr lang="en-GB" sz="2600" dirty="0"/>
+              <a:t>Why is the white noise a predictable time series? What is its forecast? What is its error? Explain it </a:t>
+            </a:r>
+            <a:r>
+              <a:rPr lang="en-GB" sz="2600" dirty="0" err="1"/>
+              <a:t>w.r.t.</a:t>
+            </a:r>
+            <a:r>
+              <a:rPr lang="en-GB" sz="2600" dirty="0"/>
+              <a:t> the possible components of a time series.</a:t>
+            </a:r>
+          </a:p>
+          <a:p>
+            <a:r>
+              <a:rPr lang="en-GB" sz="2600" dirty="0"/>
+              <a:t>Which are the methods to test for stationarity? Explain one of them in detail</a:t>
+            </a:r>
+          </a:p>
+          <a:p>
+            <a:r>
+              <a:rPr lang="en-GB" sz="2600" dirty="0"/>
+              <a:t>Which are the typical time series components? Illustrate your explanation with an example</a:t>
+            </a:r>
+          </a:p>
+          <a:p>
+            <a:r>
+              <a:rPr lang="en-GB" sz="2600" dirty="0"/>
+              <a:t>Which are the methods to detrend a time series? Explain one of them in detail</a:t>
+            </a:r>
+          </a:p>
+          <a:p>
+            <a:r>
+              <a:rPr lang="en-GB" sz="2600" dirty="0"/>
+              <a:t>Which are the methods to identify seasonality in a time series? Explain one of them in detail</a:t>
+            </a:r>
+          </a:p>
+          <a:p>
+            <a:r>
+              <a:rPr lang="en-GB" sz="2600" dirty="0"/>
+              <a:t>Which are the methods to forecast a time series? Compare two methods of your choice (excluding the basic ones)</a:t>
+            </a:r>
+          </a:p>
+          <a:p>
+            <a:r>
+              <a:rPr lang="en-GB" sz="2600" dirty="0"/>
+              <a:t>What are the components of a SARIMAX model? </a:t>
+            </a:r>
+          </a:p>
+          <a:p>
+            <a:endParaRPr lang="en-GB" sz="2600" dirty="0"/>
           </a:p>
           <a:p>
             <a:pPr marL="0" indent="0">
               <a:buNone/>
             </a:pPr>
-            <a:endParaRPr lang="en-GB" dirty="0"/>
-          </a:p>
-          <a:p>
-            <a:endParaRPr lang="en-GB" dirty="0"/>
+            <a:endParaRPr lang="en-GB" sz="2600" dirty="0"/>
+          </a:p>
+          <a:p>
+            <a:endParaRPr lang="en-GB" sz="2600" dirty="0"/>
           </a:p>
         </p:txBody>
       </p:sp>
@@ -7980,7 +8510,7 @@
     </p:spTree>
     <p:extLst>
       <p:ext uri="{BB962C8B-B14F-4D97-AF65-F5344CB8AC3E}">
-        <p14:creationId xmlns:p14="http://schemas.microsoft.com/office/powerpoint/2010/main" val="524634608"/>
+        <p14:creationId xmlns:p14="http://schemas.microsoft.com/office/powerpoint/2010/main" val="3941356368"/>
       </p:ext>
     </p:extLst>
   </p:cSld>
@@ -8025,8 +8555,8 @@
         </p:nvSpPr>
         <p:spPr>
           <a:xfrm>
-            <a:off x="838199" y="365125"/>
-            <a:ext cx="11353801" cy="1325563"/>
+            <a:off x="838200" y="365125"/>
+            <a:ext cx="11102788" cy="1325563"/>
           </a:xfrm>
         </p:spPr>
         <p:txBody>
@@ -8036,27 +8566,35 @@
           <a:lstStyle/>
           <a:p>
             <a:r>
-              <a:rPr lang="it-IT" b="1" dirty="0" err="1"/>
+              <a:rPr lang="it-IT" sz="4000" b="1" dirty="0" err="1"/>
               <a:t>Questions</a:t>
             </a:r>
             <a:r>
-              <a:rPr lang="it-IT" dirty="0"/>
+              <a:rPr lang="it-IT" sz="4000" dirty="0"/>
               <a:t> to test the </a:t>
             </a:r>
             <a:r>
-              <a:rPr lang="it-IT" b="1" dirty="0" err="1"/>
-              <a:t>breadth</a:t>
-            </a:r>
-            <a:r>
-              <a:rPr lang="it-IT" dirty="0"/>
+              <a:rPr lang="en-GB" sz="4000" b="1" dirty="0"/>
+              <a:t>depth</a:t>
+            </a:r>
+            <a:r>
+              <a:rPr lang="it-IT" sz="4000" dirty="0"/>
               <a:t> of </a:t>
             </a:r>
             <a:r>
-              <a:rPr lang="it-IT" dirty="0" err="1"/>
+              <a:rPr lang="it-IT" sz="4000" dirty="0" err="1"/>
               <a:t>your</a:t>
             </a:r>
             <a:r>
-              <a:rPr lang="it-IT" dirty="0"/>
+              <a:rPr lang="it-IT" sz="4000" dirty="0"/>
+              <a:t> </a:t>
+            </a:r>
+            <a:r>
+              <a:rPr lang="it-IT" sz="4000" b="1" dirty="0"/>
+              <a:t>TSA</a:t>
+            </a:r>
+            <a:r>
+              <a:rPr lang="it-IT" sz="4000" dirty="0"/>
               <a:t> knowledge</a:t>
             </a:r>
           </a:p>
@@ -8080,75 +8618,103 @@
         </p:nvSpPr>
         <p:spPr>
           <a:xfrm>
-            <a:off x="838199" y="1627626"/>
-            <a:ext cx="10791092" cy="4665663"/>
+            <a:off x="838199" y="1537487"/>
+            <a:ext cx="11102787" cy="4639477"/>
           </a:xfrm>
           <a:noFill/>
         </p:spPr>
         <p:txBody>
           <a:bodyPr>
-            <a:normAutofit fontScale="92500"/>
+            <a:normAutofit fontScale="70000" lnSpcReduction="20000"/>
           </a:bodyPr>
           <a:lstStyle/>
           <a:p>
             <a:r>
-              <a:rPr lang="en-GB" sz="2600" dirty="0"/>
-              <a:t>Which characteristics can a non-stationary time series have?</a:t>
-            </a:r>
-          </a:p>
-          <a:p>
-            <a:r>
-              <a:rPr lang="en-GB" sz="2600" dirty="0"/>
-              <a:t>Why is the white noise the ”perfect” time series?</a:t>
-            </a:r>
-          </a:p>
-          <a:p>
-            <a:r>
-              <a:rPr lang="en-GB" sz="2600" dirty="0"/>
-              <a:t>Which are the methods to test for stationarity? Explain one of them in detail</a:t>
-            </a:r>
-          </a:p>
-          <a:p>
-            <a:r>
-              <a:rPr lang="en-GB" sz="2600" dirty="0"/>
-              <a:t>Which are the typical time series components? Illustrate your explanation with an example</a:t>
-            </a:r>
-          </a:p>
-          <a:p>
-            <a:r>
-              <a:rPr lang="en-GB" sz="2600" dirty="0"/>
-              <a:t>Which are the methods to detrend a time series? Explain one of them in detail</a:t>
-            </a:r>
-          </a:p>
-          <a:p>
-            <a:r>
-              <a:rPr lang="en-GB" sz="2600" dirty="0"/>
-              <a:t>Which are the methods to identify seasonality in a time series? Explain one of them in detail</a:t>
-            </a:r>
-          </a:p>
-          <a:p>
-            <a:r>
-              <a:rPr lang="en-GB" sz="2600" dirty="0"/>
-              <a:t>Which are the methods to forecast a time series? Compare two methods of your choice (excluding the basic ones)</a:t>
-            </a:r>
-          </a:p>
-          <a:p>
-            <a:r>
-              <a:rPr lang="en-GB" sz="2600" dirty="0"/>
-              <a:t>Which are the components of a SARIMA model?</a:t>
-            </a:r>
-          </a:p>
-          <a:p>
-            <a:endParaRPr lang="en-GB" sz="2600" dirty="0"/>
-          </a:p>
-          <a:p>
-            <a:pPr marL="0" indent="0">
-              <a:buNone/>
-            </a:pPr>
-            <a:endParaRPr lang="en-GB" sz="2600" dirty="0"/>
-          </a:p>
-          <a:p>
-            <a:endParaRPr lang="en-GB" sz="2600" dirty="0"/>
+              <a:rPr lang="en-US" dirty="0">
+                <a:latin typeface="Calibri" panose="020F0502020204030204" pitchFamily="34" charset="0"/>
+                <a:cs typeface="Calibri" panose="020F0502020204030204" pitchFamily="34" charset="0"/>
+              </a:rPr>
+              <a:t>What’s the difference between an additive and a multiplicative model for time series decomposition? </a:t>
+            </a:r>
+            <a:r>
+              <a:rPr lang="en-GB" sz="2800" dirty="0"/>
+              <a:t>Illustrate your explanation with an example</a:t>
+            </a:r>
+            <a:endParaRPr lang="en-GB" dirty="0"/>
+          </a:p>
+          <a:p>
+            <a:r>
+              <a:rPr lang="en-GB" dirty="0"/>
+              <a:t>Why is exponential smoothing named in this way? Discuss the formula of at least one of the three methods presented in the course.</a:t>
+            </a:r>
+          </a:p>
+          <a:p>
+            <a:r>
+              <a:rPr lang="en-GB" dirty="0"/>
+              <a:t>What’s the difference between simple, double, and triple exponential smoothing? </a:t>
+            </a:r>
+            <a:r>
+              <a:rPr lang="en-GB" sz="2800" dirty="0"/>
+              <a:t>Illustrate your explanation with an example</a:t>
+            </a:r>
+            <a:endParaRPr lang="en-GB" dirty="0"/>
+          </a:p>
+          <a:p>
+            <a:r>
+              <a:rPr lang="en-GB" dirty="0"/>
+              <a:t>What’s the difference between the meaning of moving average in time series decomposition and the MA component in ARMA models? </a:t>
+            </a:r>
+            <a:r>
+              <a:rPr lang="en-GB" sz="2800" dirty="0"/>
+              <a:t>Illustrate your explanation with an example</a:t>
+            </a:r>
+            <a:endParaRPr lang="en-GB" dirty="0"/>
+          </a:p>
+          <a:p>
+            <a:r>
+              <a:rPr lang="en-GB" dirty="0"/>
+              <a:t>What’s the definition of Autocorrelation? How does it differ from the definition of correlation? </a:t>
+            </a:r>
+            <a:r>
+              <a:rPr lang="en-GB" sz="2800" dirty="0"/>
+              <a:t>Illustrate your explanation with an example</a:t>
+            </a:r>
+            <a:endParaRPr lang="en-GB" dirty="0"/>
+          </a:p>
+          <a:p>
+            <a:r>
+              <a:rPr lang="en-GB" dirty="0"/>
+              <a:t>What’s the difference between the AR and the MA part of an ARMA model? What is their relation to Autocorrelation and Partial Autocorrelation? </a:t>
+            </a:r>
+            <a:r>
+              <a:rPr lang="en-GB" sz="2800" dirty="0"/>
+              <a:t>Illustrate your explanation with an example.</a:t>
+            </a:r>
+            <a:endParaRPr lang="en-GB" dirty="0"/>
+          </a:p>
+          <a:p>
+            <a:r>
+              <a:rPr lang="en-GB" dirty="0"/>
+              <a:t>How does the Box-Jenkins Methodology for ARMA models allow us to estimate the orders of the model? </a:t>
+            </a:r>
+            <a:r>
+              <a:rPr lang="en-GB" sz="2800" dirty="0"/>
+              <a:t>Illustrate your explanation with an example</a:t>
+            </a:r>
+          </a:p>
+          <a:p>
+            <a:r>
+              <a:rPr lang="en-GB" dirty="0"/>
+              <a:t>What are the exogenous variables in TSA? How do they contribute to the forecasting? What’s their impact on the confidence interval? </a:t>
+            </a:r>
+            <a:r>
+              <a:rPr lang="en-GB" sz="2800" dirty="0"/>
+              <a:t>Illustrate your explanation with an example</a:t>
+            </a:r>
+            <a:endParaRPr lang="en-GB" dirty="0"/>
+          </a:p>
+          <a:p>
+            <a:endParaRPr lang="en-GB" dirty="0"/>
           </a:p>
         </p:txBody>
       </p:sp>
@@ -8212,7 +8778,7 @@
     </p:spTree>
     <p:extLst>
       <p:ext uri="{BB962C8B-B14F-4D97-AF65-F5344CB8AC3E}">
-        <p14:creationId xmlns:p14="http://schemas.microsoft.com/office/powerpoint/2010/main" val="3941356368"/>
+        <p14:creationId xmlns:p14="http://schemas.microsoft.com/office/powerpoint/2010/main" val="4041868519"/>
       </p:ext>
     </p:extLst>
   </p:cSld>
@@ -8257,8 +8823,8 @@
         </p:nvSpPr>
         <p:spPr>
           <a:xfrm>
-            <a:off x="838199" y="365125"/>
-            <a:ext cx="11353801" cy="1325563"/>
+            <a:off x="838200" y="365125"/>
+            <a:ext cx="11591166" cy="1325563"/>
           </a:xfrm>
         </p:spPr>
         <p:txBody>
@@ -8268,28 +8834,28 @@
           <a:lstStyle/>
           <a:p>
             <a:r>
-              <a:rPr lang="it-IT" b="1" dirty="0" err="1"/>
+              <a:rPr lang="it-IT" sz="4000" b="1" dirty="0" err="1"/>
               <a:t>Questions</a:t>
             </a:r>
             <a:r>
-              <a:rPr lang="it-IT" dirty="0"/>
+              <a:rPr lang="it-IT" sz="4000" dirty="0"/>
               <a:t> to test the </a:t>
             </a:r>
             <a:r>
-              <a:rPr lang="it-IT" b="1" dirty="0" err="1"/>
+              <a:rPr lang="it-IT" sz="4000" b="1" dirty="0" err="1"/>
               <a:t>breadth</a:t>
             </a:r>
             <a:r>
-              <a:rPr lang="it-IT" dirty="0"/>
+              <a:rPr lang="it-IT" sz="4000" dirty="0"/>
               <a:t> of </a:t>
             </a:r>
             <a:r>
-              <a:rPr lang="it-IT" dirty="0" err="1"/>
+              <a:rPr lang="it-IT" sz="4000" dirty="0" err="1"/>
               <a:t>your</a:t>
             </a:r>
             <a:r>
-              <a:rPr lang="it-IT" dirty="0"/>
-              <a:t> knowledge</a:t>
+              <a:rPr lang="it-IT" sz="4000" dirty="0"/>
+              <a:t> SML knowledge</a:t>
             </a:r>
           </a:p>
         </p:txBody>
@@ -8319,39 +8885,57 @@
         </p:spPr>
         <p:txBody>
           <a:bodyPr>
-            <a:normAutofit/>
+            <a:normAutofit fontScale="85000" lnSpcReduction="20000"/>
           </a:bodyPr>
           <a:lstStyle/>
           <a:p>
             <a:r>
               <a:rPr lang="en-GB" dirty="0"/>
-              <a:t>Which are the main differences between Streaming Machine Learning and Continual Learning paradigms?</a:t>
+              <a:t>What are the differences between batch-oriented Machine Learning and Streaming Machine Learning?</a:t>
             </a:r>
           </a:p>
           <a:p>
             <a:r>
               <a:rPr lang="en-GB" dirty="0"/>
-              <a:t>Which are the main Continual Learning strategies to avoid catastrophic forgetting?</a:t>
+              <a:t>What are the benefits and the challenges of Streaming Machine Learning?</a:t>
             </a:r>
           </a:p>
           <a:p>
             <a:r>
               <a:rPr lang="en-GB" dirty="0"/>
-              <a:t>Which are the primary evaluation metrics used in Continual Learning?</a:t>
+              <a:t>What is a concept drift? Which are the types of concept drift? Why is it so important to detect it? Illustrate the difference using the Bayes Theorem and with an example</a:t>
             </a:r>
           </a:p>
           <a:p>
             <a:r>
               <a:rPr lang="en-GB" dirty="0"/>
-              <a:t>What’s the stability-plasticity dilemma? </a:t>
-            </a:r>
-            <a:r>
-              <a:rPr lang="en-GB" sz="2800" dirty="0"/>
-              <a:t>Illustrate your explanation with an example and discuss the different learning abilities</a:t>
-            </a:r>
+              <a:t>How can you classify a concept drift with respect to the speed of change? Illustrate the difference with several examples</a:t>
+            </a:r>
+          </a:p>
+          <a:p>
             <a:r>
               <a:rPr lang="en-GB" dirty="0"/>
-              <a:t>.</a:t>
+              <a:t>Which are the typical Streaming Machine Learning algorithms for classification? Illustrate one of them in detail.</a:t>
+            </a:r>
+          </a:p>
+          <a:p>
+            <a:r>
+              <a:rPr lang="en-GB" dirty="0"/>
+              <a:t>What are the components of an SML Ensemble Classification model?</a:t>
+            </a:r>
+          </a:p>
+          <a:p>
+            <a:r>
+              <a:rPr lang="en-GB" dirty="0"/>
+              <a:t>How does SML regression compare to time series forecasting </a:t>
+            </a:r>
+            <a:r>
+              <a:rPr lang="en-GB" dirty="0" err="1"/>
+              <a:t>w.r.t.</a:t>
+            </a:r>
+            <a:r>
+              <a:rPr lang="en-GB" dirty="0"/>
+              <a:t> types of input features, training, forecasting horizon, and adaptability? </a:t>
             </a:r>
           </a:p>
           <a:p>
@@ -8425,7 +9009,7 @@
     </p:spTree>
     <p:extLst>
       <p:ext uri="{BB962C8B-B14F-4D97-AF65-F5344CB8AC3E}">
-        <p14:creationId xmlns:p14="http://schemas.microsoft.com/office/powerpoint/2010/main" val="2604191554"/>
+        <p14:creationId xmlns:p14="http://schemas.microsoft.com/office/powerpoint/2010/main" val="524634608"/>
       </p:ext>
     </p:extLst>
   </p:cSld>
@@ -8481,34 +9065,37 @@
           <a:lstStyle/>
           <a:p>
             <a:r>
-              <a:rPr lang="it-IT" b="1" dirty="0" err="1"/>
+              <a:rPr lang="it-IT" sz="4000" b="1" dirty="0" err="1"/>
               <a:t>Questions</a:t>
             </a:r>
             <a:r>
-              <a:rPr lang="it-IT" dirty="0"/>
+              <a:rPr lang="it-IT" sz="4000" dirty="0"/>
               <a:t> to test the </a:t>
             </a:r>
             <a:r>
-              <a:rPr lang="en-GB" b="1" dirty="0"/>
+              <a:rPr lang="en-GB" sz="4000" b="1" dirty="0"/>
               <a:t>depth</a:t>
             </a:r>
             <a:r>
-              <a:rPr lang="it-IT" dirty="0"/>
+              <a:rPr lang="it-IT" sz="4000" dirty="0"/>
               <a:t> of </a:t>
             </a:r>
             <a:r>
-              <a:rPr lang="it-IT" dirty="0" err="1"/>
+              <a:rPr lang="it-IT" sz="4000" dirty="0" err="1"/>
               <a:t>your</a:t>
             </a:r>
             <a:r>
-              <a:rPr lang="it-IT" dirty="0"/>
+              <a:rPr lang="it-IT" sz="4000" dirty="0"/>
               <a:t> </a:t>
             </a:r>
             <a:r>
-              <a:rPr lang="it-IT" dirty="0" err="1"/>
-              <a:t>knowledge</a:t>
-            </a:r>
-            <a:endParaRPr lang="it-IT" dirty="0"/>
+              <a:rPr lang="it-IT" sz="4000" b="1" dirty="0"/>
+              <a:t>SML</a:t>
+            </a:r>
+            <a:r>
+              <a:rPr lang="it-IT" sz="4000" dirty="0"/>
+              <a:t> knowledge</a:t>
+            </a:r>
           </a:p>
         </p:txBody>
       </p:sp>
@@ -8537,19 +9124,38 @@
         </p:spPr>
         <p:txBody>
           <a:bodyPr>
-            <a:normAutofit fontScale="77500" lnSpcReduction="20000"/>
+            <a:normAutofit lnSpcReduction="10000"/>
           </a:bodyPr>
           <a:lstStyle/>
           <a:p>
             <a:r>
               <a:rPr lang="en-GB" dirty="0"/>
-              <a:t>What is a concept drift detector? Illustrate how one of them works.</a:t>
+              <a:t>Which are the concept drift detectors that monitor the error rate? Illustrate how one of them works.</a:t>
             </a:r>
           </a:p>
           <a:p>
             <a:r>
               <a:rPr lang="en-GB" dirty="0"/>
-              <a:t>How does ADWIN detect a concept drift?</a:t>
+              <a:t>Which are the data drift detectors? Illustrate how one of them works.</a:t>
+            </a:r>
+          </a:p>
+          <a:p>
+            <a:r>
+              <a:rPr lang="en-GB" dirty="0"/>
+              <a:t>How does ADWIN detect a concept drift? Illustrate it with an example.</a:t>
+            </a:r>
+            <a:endParaRPr lang="en-US" dirty="0">
+              <a:highlight>
+                <a:srgbClr val="FFFF00"/>
+              </a:highlight>
+              <a:latin typeface="Calibri" panose="020F0502020204030204" pitchFamily="34" charset="0"/>
+              <a:cs typeface="Calibri" panose="020F0502020204030204" pitchFamily="34" charset="0"/>
+            </a:endParaRPr>
+          </a:p>
+          <a:p>
+            <a:r>
+              <a:rPr lang="en-GB" dirty="0"/>
+              <a:t>How does the SML version of KNN work? Illustrate it with an example.</a:t>
             </a:r>
           </a:p>
           <a:p>
@@ -8558,22 +9164,21 @@
                 <a:latin typeface="Calibri" panose="020F0502020204030204" pitchFamily="34" charset="0"/>
                 <a:cs typeface="Calibri" panose="020F0502020204030204" pitchFamily="34" charset="0"/>
               </a:rPr>
-              <a:t>Given the plot of data distribution, tell which kind of drift occurred and if it necessary to change the decision boundary.</a:t>
-            </a:r>
-          </a:p>
-          <a:p>
+              <a:t>What is </a:t>
+            </a:r>
+            <a:r>
+              <a:rPr lang="en-US" dirty="0" err="1">
+                <a:latin typeface="Calibri" panose="020F0502020204030204" pitchFamily="34" charset="0"/>
+                <a:cs typeface="Calibri" panose="020F0502020204030204" pitchFamily="34" charset="0"/>
+              </a:rPr>
+              <a:t>Hoeffding</a:t>
+            </a:r>
             <a:r>
               <a:rPr lang="en-US" dirty="0">
                 <a:latin typeface="Calibri" panose="020F0502020204030204" pitchFamily="34" charset="0"/>
                 <a:cs typeface="Calibri" panose="020F0502020204030204" pitchFamily="34" charset="0"/>
               </a:rPr>
-              <a:t>Given the plot of the model performance, tell if there is a drift and if the model is able to adapt to it. </a:t>
-            </a:r>
-          </a:p>
-          <a:p>
-            <a:r>
-              <a:rPr lang="en-GB" dirty="0"/>
-              <a:t>How does the SML version of KNN work?</a:t>
+              <a:t> Bound? How and why is it used in SML to build a decision tree?</a:t>
             </a:r>
           </a:p>
           <a:p>
@@ -8582,36 +9187,14 @@
                 <a:latin typeface="Calibri" panose="020F0502020204030204" pitchFamily="34" charset="0"/>
                 <a:cs typeface="Calibri" panose="020F0502020204030204" pitchFamily="34" charset="0"/>
               </a:rPr>
-              <a:t>Why is Hoeffding Bound used in SML to build a decision tree?</a:t>
-            </a:r>
-          </a:p>
-          <a:p>
-            <a:r>
-              <a:rPr lang="en-US" dirty="0">
-                <a:latin typeface="Calibri" panose="020F0502020204030204" pitchFamily="34" charset="0"/>
-                <a:cs typeface="Calibri" panose="020F0502020204030204" pitchFamily="34" charset="0"/>
-              </a:rPr>
-              <a:t>How the Poisson distribution is used in SML and what is the difference in using lambda equal to 1 and 6?</a:t>
-            </a:r>
-          </a:p>
-          <a:p>
-            <a:r>
-              <a:rPr lang="en-US" dirty="0">
-                <a:latin typeface="Calibri" panose="020F0502020204030204" pitchFamily="34" charset="0"/>
-                <a:cs typeface="Calibri" panose="020F0502020204030204" pitchFamily="34" charset="0"/>
-              </a:rPr>
-              <a:t>What’s the difference between an additive and a multiplicative model for time series decomposition? </a:t>
-            </a:r>
-          </a:p>
-          <a:p>
-            <a:r>
-              <a:rPr lang="en-US" dirty="0">
-                <a:latin typeface="Calibri" panose="020F0502020204030204" pitchFamily="34" charset="0"/>
-                <a:cs typeface="Calibri" panose="020F0502020204030204" pitchFamily="34" charset="0"/>
-              </a:rPr>
-              <a:t>Given the plot from the additive and the multiplicative decomposition, tell which decomposition suits better and why.</a:t>
-            </a:r>
-            <a:endParaRPr lang="en-GB" dirty="0"/>
+              <a:t>Why is the Poisson distribution used in SML ensemble methods? What’s the impact of the value of lambda? Illustrate how lambda is used in the SML methods.</a:t>
+            </a:r>
+          </a:p>
+          <a:p>
+            <a:endParaRPr lang="en-US" dirty="0">
+              <a:latin typeface="Calibri" panose="020F0502020204030204" pitchFamily="34" charset="0"/>
+              <a:cs typeface="Calibri" panose="020F0502020204030204" pitchFamily="34" charset="0"/>
+            </a:endParaRPr>
           </a:p>
           <a:p>
             <a:endParaRPr lang="en-GB" dirty="0"/>
@@ -8726,8 +9309,8 @@
         </p:nvSpPr>
         <p:spPr>
           <a:xfrm>
-            <a:off x="838200" y="365125"/>
-            <a:ext cx="11102788" cy="1325563"/>
+            <a:off x="404603" y="365125"/>
+            <a:ext cx="11787398" cy="1325563"/>
           </a:xfrm>
         </p:spPr>
         <p:txBody>
@@ -8737,34 +9320,45 @@
           <a:lstStyle/>
           <a:p>
             <a:r>
-              <a:rPr lang="it-IT" b="1" dirty="0" err="1"/>
+              <a:rPr lang="it-IT" sz="3600" b="1" dirty="0" err="1"/>
               <a:t>Questions</a:t>
             </a:r>
             <a:r>
-              <a:rPr lang="it-IT" dirty="0"/>
+              <a:rPr lang="it-IT" sz="3600" dirty="0"/>
               <a:t> to test the </a:t>
             </a:r>
             <a:r>
-              <a:rPr lang="en-GB" b="1" dirty="0"/>
+              <a:rPr lang="it-IT" sz="3600" b="1" dirty="0" err="1"/>
+              <a:t>breadth</a:t>
+            </a:r>
+            <a:r>
+              <a:rPr lang="it-IT" sz="3600" b="1" dirty="0"/>
+              <a:t> &amp; </a:t>
+            </a:r>
+            <a:r>
+              <a:rPr lang="it-IT" sz="3600" b="1" dirty="0" err="1"/>
               <a:t>depth</a:t>
             </a:r>
             <a:r>
-              <a:rPr lang="it-IT" dirty="0"/>
+              <a:rPr lang="it-IT" sz="3600" dirty="0"/>
               <a:t> of </a:t>
             </a:r>
             <a:r>
-              <a:rPr lang="it-IT" dirty="0" err="1"/>
+              <a:rPr lang="it-IT" sz="3600" dirty="0" err="1"/>
               <a:t>your</a:t>
             </a:r>
             <a:r>
-              <a:rPr lang="it-IT" dirty="0"/>
+              <a:rPr lang="it-IT" sz="3600" dirty="0"/>
               <a:t> </a:t>
             </a:r>
             <a:r>
-              <a:rPr lang="it-IT" dirty="0" err="1"/>
-              <a:t>knowledge</a:t>
-            </a:r>
-            <a:endParaRPr lang="it-IT" dirty="0"/>
+              <a:rPr lang="it-IT" sz="3600" b="1" dirty="0"/>
+              <a:t>CL</a:t>
+            </a:r>
+            <a:r>
+              <a:rPr lang="it-IT" sz="3600" dirty="0"/>
+              <a:t> knowledge</a:t>
+            </a:r>
           </a:p>
         </p:txBody>
       </p:sp>
@@ -8786,69 +9380,60 @@
         </p:nvSpPr>
         <p:spPr>
           <a:xfrm>
-            <a:off x="838199" y="1825625"/>
-            <a:ext cx="11102787" cy="4351339"/>
+            <a:off x="838200" y="1825625"/>
+            <a:ext cx="10791092" cy="4351339"/>
           </a:xfrm>
           <a:noFill/>
         </p:spPr>
         <p:txBody>
           <a:bodyPr>
-            <a:normAutofit fontScale="92500" lnSpcReduction="20000"/>
+            <a:normAutofit/>
           </a:bodyPr>
           <a:lstStyle/>
           <a:p>
             <a:r>
-              <a:rPr lang="en-US" dirty="0">
-                <a:latin typeface="Calibri" panose="020F0502020204030204" pitchFamily="34" charset="0"/>
-                <a:cs typeface="Calibri" panose="020F0502020204030204" pitchFamily="34" charset="0"/>
-              </a:rPr>
-              <a:t>Given a line chart that illustrate a time series, tell if it is stationary and why.</a:t>
-            </a:r>
-            <a:endParaRPr lang="en-GB" dirty="0"/>
-          </a:p>
-          <a:p>
-            <a:r>
               <a:rPr lang="en-GB" dirty="0"/>
-              <a:t>Why is exponential smoothing named in this way?</a:t>
-            </a:r>
-          </a:p>
-          <a:p>
+              <a:t>What’s the stability-plasticity dilemma? </a:t>
+            </a:r>
+            <a:r>
+              <a:rPr lang="en-GB" sz="2800" dirty="0"/>
+              <a:t>Illustrate your explanation with an example and discuss the different learning abilities</a:t>
+            </a:r>
             <a:r>
               <a:rPr lang="en-GB" dirty="0"/>
-              <a:t>What’s the difference between simple, double, and triple exponential smoothing?</a:t>
+              <a:t>.</a:t>
             </a:r>
           </a:p>
           <a:p>
             <a:r>
               <a:rPr lang="en-GB" dirty="0"/>
-              <a:t>What’s the difference between the meaning of moving average in time series decomposition and the MA component in ARMA models?</a:t>
-            </a:r>
-          </a:p>
-          <a:p>
+              <a:t>What are the main differences between Streaming Machine Learning and Continual Learning paradigms? Discuss it </a:t>
+            </a:r>
+            <a:r>
+              <a:rPr lang="en-GB" dirty="0" err="1"/>
+              <a:t>w.r.t</a:t>
+            </a:r>
             <a:r>
               <a:rPr lang="en-GB" dirty="0"/>
-              <a:t>What’s the definition of Autocorrelation? How does it differ from the definition of correlation?</a:t>
+              <a:t> to the objective of the methods and the type of data they process</a:t>
             </a:r>
           </a:p>
           <a:p>
             <a:r>
               <a:rPr lang="en-GB" dirty="0"/>
-              <a:t>Given an ACF and a PACF plot, discuss the order of the AR and MA components.</a:t>
+              <a:t>What are the three main categories of Continual Learning strategies? Explain one in detail.</a:t>
             </a:r>
           </a:p>
           <a:p>
             <a:r>
               <a:rPr lang="en-GB" dirty="0"/>
-              <a:t>What’s the difference between the AR and the MA part of an ARMA model?</a:t>
-            </a:r>
-          </a:p>
-          <a:p>
-            <a:r>
-              <a:rPr lang="en-GB" dirty="0"/>
-              <a:t>How does the Box-Jenkins Methodology for ARIMA models allow us to estimate the orders of the model?</a:t>
-            </a:r>
-          </a:p>
-          <a:p>
+              <a:t>Which are the primary evaluation metrics used in Continual Learning? Illustrate what they measure and why they are all useful to assess the properties of a method.</a:t>
+            </a:r>
+          </a:p>
+          <a:p>
+            <a:pPr marL="0" indent="0">
+              <a:buNone/>
+            </a:pPr>
             <a:endParaRPr lang="en-GB" dirty="0"/>
           </a:p>
           <a:p>
@@ -8916,7 +9501,7 @@
     </p:spTree>
     <p:extLst>
       <p:ext uri="{BB962C8B-B14F-4D97-AF65-F5344CB8AC3E}">
-        <p14:creationId xmlns:p14="http://schemas.microsoft.com/office/powerpoint/2010/main" val="4041868519"/>
+        <p14:creationId xmlns:p14="http://schemas.microsoft.com/office/powerpoint/2010/main" val="2604191554"/>
       </p:ext>
     </p:extLst>
   </p:cSld>
@@ -8959,12 +9544,7 @@
             <p:ph type="title"/>
           </p:nvPr>
         </p:nvSpPr>
-        <p:spPr>
-          <a:xfrm>
-            <a:off x="838200" y="365125"/>
-            <a:ext cx="11102788" cy="1325563"/>
-          </a:xfrm>
-        </p:spPr>
+        <p:spPr/>
         <p:txBody>
           <a:bodyPr>
             <a:normAutofit/>
@@ -8972,34 +9552,222 @@
           <a:lstStyle/>
           <a:p>
             <a:r>
-              <a:rPr lang="it-IT" b="1" dirty="0" err="1"/>
-              <a:t>Questions</a:t>
-            </a:r>
-            <a:r>
-              <a:rPr lang="it-IT" dirty="0"/>
-              <a:t> to test the </a:t>
-            </a:r>
-            <a:r>
               <a:rPr lang="en-GB" b="1" dirty="0"/>
-              <a:t>depth</a:t>
-            </a:r>
-            <a:r>
-              <a:rPr lang="it-IT" dirty="0"/>
-              <a:t> of </a:t>
-            </a:r>
-            <a:r>
-              <a:rPr lang="it-IT" dirty="0" err="1"/>
-              <a:t>your</a:t>
-            </a:r>
-            <a:r>
-              <a:rPr lang="it-IT" dirty="0"/>
+              <a:t>Exercises</a:t>
+            </a:r>
+            <a:r>
+              <a:rPr lang="en-GB" dirty="0"/>
               <a:t> </a:t>
             </a:r>
             <a:r>
-              <a:rPr lang="it-IT" dirty="0" err="1"/>
-              <a:t>knowledge</a:t>
-            </a:r>
-            <a:endParaRPr lang="it-IT" dirty="0"/>
+              <a:rPr lang="en-GB"/>
+              <a:t>on </a:t>
+            </a:r>
+            <a:r>
+              <a:rPr lang="en-GB" b="1"/>
+              <a:t>TSA</a:t>
+            </a:r>
+            <a:endParaRPr lang="it-IT" b="1" dirty="0"/>
+          </a:p>
+        </p:txBody>
+      </p:sp>
+      <p:sp>
+        <p:nvSpPr>
+          <p:cNvPr id="10" name="Content Placeholder 9">
+            <a:extLst>
+              <a:ext uri="{FF2B5EF4-FFF2-40B4-BE49-F238E27FC236}">
+                <a16:creationId xmlns:a16="http://schemas.microsoft.com/office/drawing/2014/main" id="{74517F86-4B29-7742-9D41-82F9D9CAC7B3}"/>
+              </a:ext>
+            </a:extLst>
+          </p:cNvPr>
+          <p:cNvSpPr>
+            <a:spLocks noGrp="1"/>
+          </p:cNvSpPr>
+          <p:nvPr>
+            <p:ph idx="1"/>
+          </p:nvPr>
+        </p:nvSpPr>
+        <p:spPr>
+          <a:xfrm>
+            <a:off x="838200" y="1825625"/>
+            <a:ext cx="10791092" cy="4351339"/>
+          </a:xfrm>
+          <a:solidFill>
+            <a:srgbClr val="FFC000"/>
+          </a:solidFill>
+        </p:spPr>
+        <p:txBody>
+          <a:bodyPr>
+            <a:normAutofit fontScale="62500" lnSpcReduction="20000"/>
+          </a:bodyPr>
+          <a:lstStyle/>
+          <a:p>
+            <a:r>
+              <a:rPr lang="en-GB" dirty="0"/>
+              <a:t>Code-snippets fill-in &amp; comment</a:t>
+            </a:r>
+          </a:p>
+          <a:p>
+            <a:endParaRPr lang="en-GB" dirty="0"/>
+          </a:p>
+          <a:p>
+            <a:r>
+              <a:rPr lang="en-US" dirty="0">
+                <a:latin typeface="Calibri" panose="020F0502020204030204" pitchFamily="34" charset="0"/>
+                <a:cs typeface="Calibri" panose="020F0502020204030204" pitchFamily="34" charset="0"/>
+              </a:rPr>
+              <a:t>Given the plot from the additive and the multiplicative decomposition, tell which decomposition suits better and why.</a:t>
+            </a:r>
+            <a:endParaRPr lang="en-GB" dirty="0"/>
+          </a:p>
+          <a:p>
+            <a:r>
+              <a:rPr lang="en-US" dirty="0">
+                <a:latin typeface="Calibri" panose="020F0502020204030204" pitchFamily="34" charset="0"/>
+                <a:cs typeface="Calibri" panose="020F0502020204030204" pitchFamily="34" charset="0"/>
+              </a:rPr>
+              <a:t>Given a line chart that illustrate a time series, tell if it is stationary and why.</a:t>
+            </a:r>
+          </a:p>
+          <a:p>
+            <a:r>
+              <a:rPr lang="en-GB" dirty="0"/>
+              <a:t>Given an ACF and a PACF plot, discuss the order of the AR and MA components.</a:t>
+            </a:r>
+          </a:p>
+          <a:p>
+            <a:endParaRPr lang="en-GB" dirty="0"/>
+          </a:p>
+          <a:p>
+            <a:pPr marL="0" indent="0">
+              <a:buNone/>
+            </a:pPr>
+            <a:endParaRPr lang="en-GB" sz="2400" dirty="0"/>
+          </a:p>
+          <a:p>
+            <a:pPr marL="0" indent="0">
+              <a:buNone/>
+            </a:pPr>
+            <a:r>
+              <a:rPr lang="en-GB" sz="2200" dirty="0" err="1"/>
+              <a:t>mul_decomposition</a:t>
+            </a:r>
+            <a:r>
+              <a:rPr lang="en-GB" sz="2200" dirty="0"/>
+              <a:t> = </a:t>
+            </a:r>
+            <a:r>
+              <a:rPr lang="en-GB" sz="2200" dirty="0" err="1"/>
+              <a:t>sm.tsa.seasonal_decompose</a:t>
+            </a:r>
+            <a:r>
+              <a:rPr lang="en-GB" sz="2200" dirty="0"/>
+              <a:t>(……, ………)</a:t>
+            </a:r>
+          </a:p>
+          <a:p>
+            <a:pPr marL="0" indent="0">
+              <a:buNone/>
+            </a:pPr>
+            <a:r>
+              <a:rPr lang="en-GB" sz="2200" dirty="0"/>
+              <a:t>………………. # plot the multiplicative decomposition</a:t>
+            </a:r>
+          </a:p>
+          <a:p>
+            <a:pPr marL="0" indent="0">
+              <a:buNone/>
+            </a:pPr>
+            <a:endParaRPr lang="en-GB" sz="2200" dirty="0"/>
+          </a:p>
+          <a:p>
+            <a:pPr marL="0" indent="0">
+              <a:buNone/>
+            </a:pPr>
+            <a:r>
+              <a:rPr lang="en-GB" sz="2200" dirty="0" err="1"/>
+              <a:t>add_decomposition</a:t>
+            </a:r>
+            <a:r>
+              <a:rPr lang="en-GB" sz="2200" dirty="0"/>
+              <a:t> = </a:t>
+            </a:r>
+            <a:r>
+              <a:rPr lang="en-GB" sz="2200" dirty="0" err="1"/>
+              <a:t>sm.tsa.seasonal_decompose</a:t>
+            </a:r>
+            <a:r>
+              <a:rPr lang="en-GB" sz="2200" dirty="0"/>
+              <a:t>(……, ………)</a:t>
+            </a:r>
+          </a:p>
+          <a:p>
+            <a:pPr marL="0" indent="0">
+              <a:buNone/>
+            </a:pPr>
+            <a:r>
+              <a:rPr lang="en-GB" sz="2200" dirty="0"/>
+              <a:t>………………. # plot the additive decomposition</a:t>
+            </a:r>
+          </a:p>
+          <a:p>
+            <a:pPr marL="0" indent="0">
+              <a:buNone/>
+            </a:pPr>
+            <a:endParaRPr lang="en-GB" sz="2000" dirty="0"/>
+          </a:p>
+          <a:p>
+            <a:pPr marL="0" indent="0">
+              <a:buNone/>
+            </a:pPr>
+            <a:r>
+              <a:rPr lang="it-IT" sz="2400" dirty="0">
+                <a:cs typeface="Calibri"/>
+              </a:rPr>
+              <a:t>For</a:t>
+            </a:r>
+            <a:r>
+              <a:rPr lang="it-IT" sz="2400" spc="-5" dirty="0">
+                <a:cs typeface="Calibri"/>
+              </a:rPr>
+              <a:t> </a:t>
+            </a:r>
+            <a:r>
+              <a:rPr lang="it-IT" sz="2400" dirty="0">
+                <a:cs typeface="Calibri"/>
+              </a:rPr>
+              <a:t>the</a:t>
+            </a:r>
+            <a:r>
+              <a:rPr lang="it-IT" sz="2400" spc="20" dirty="0">
+                <a:cs typeface="Calibri"/>
+              </a:rPr>
+              <a:t> </a:t>
+            </a:r>
+            <a:r>
+              <a:rPr lang="it-IT" sz="2400" dirty="0">
+                <a:cs typeface="Calibri"/>
+              </a:rPr>
+              <a:t>solution</a:t>
+            </a:r>
+            <a:r>
+              <a:rPr lang="it-IT" sz="2400" spc="5" dirty="0">
+                <a:cs typeface="Calibri"/>
+              </a:rPr>
+              <a:t> </a:t>
+            </a:r>
+            <a:r>
+              <a:rPr lang="it-IT" sz="2400" dirty="0" err="1">
+                <a:cs typeface="Calibri"/>
+              </a:rPr>
+              <a:t>see</a:t>
+            </a:r>
+            <a:r>
+              <a:rPr lang="it-IT" sz="2400" dirty="0">
+                <a:cs typeface="Calibri"/>
+              </a:rPr>
+              <a:t> TSA_02_Decomposition.ipynb</a:t>
+            </a:r>
           </a:p>
         </p:txBody>
       </p:sp>
@@ -9060,183 +9828,10 @@
           </a:p>
         </p:txBody>
       </p:sp>
-      <p:pic>
-        <p:nvPicPr>
-          <p:cNvPr id="3" name="Immagine 2">
-            <a:extLst>
-              <a:ext uri="{FF2B5EF4-FFF2-40B4-BE49-F238E27FC236}">
-                <a16:creationId xmlns:a16="http://schemas.microsoft.com/office/drawing/2014/main" id="{AF537E5F-FBA8-9999-5BCB-B18603E34A41}"/>
-              </a:ext>
-            </a:extLst>
-          </p:cNvPr>
-          <p:cNvPicPr>
-            <a:picLocks noChangeAspect="1"/>
-          </p:cNvPicPr>
-          <p:nvPr/>
-        </p:nvPicPr>
-        <p:blipFill>
-          <a:blip r:embed="rId3"/>
-          <a:stretch>
-            <a:fillRect/>
-          </a:stretch>
-        </p:blipFill>
-        <p:spPr>
-          <a:xfrm>
-            <a:off x="3944301" y="2598175"/>
-            <a:ext cx="4303397" cy="2841866"/>
-          </a:xfrm>
-          <a:prstGeom prst="rect">
-            <a:avLst/>
-          </a:prstGeom>
-        </p:spPr>
-      </p:pic>
-      <p:sp>
-        <p:nvSpPr>
-          <p:cNvPr id="10" name="CasellaDiTesto 9">
-            <a:extLst>
-              <a:ext uri="{FF2B5EF4-FFF2-40B4-BE49-F238E27FC236}">
-                <a16:creationId xmlns:a16="http://schemas.microsoft.com/office/drawing/2014/main" id="{CA3D1101-8AB6-E436-8043-632F19C6F9C6}"/>
-              </a:ext>
-            </a:extLst>
-          </p:cNvPr>
-          <p:cNvSpPr txBox="1"/>
-          <p:nvPr/>
-        </p:nvSpPr>
-        <p:spPr>
-          <a:xfrm>
-            <a:off x="838200" y="1630382"/>
-            <a:ext cx="10515600" cy="892552"/>
-          </a:xfrm>
-          <a:prstGeom prst="rect">
-            <a:avLst/>
-          </a:prstGeom>
-          <a:noFill/>
-        </p:spPr>
-        <p:txBody>
-          <a:bodyPr wrap="square">
-            <a:spAutoFit/>
-          </a:bodyPr>
-          <a:lstStyle/>
-          <a:p>
-            <a:pPr algn="l"/>
-            <a:r>
-              <a:rPr lang="en-GB" sz="2600" dirty="0">
-                <a:solidFill>
-                  <a:srgbClr val="242424"/>
-                </a:solidFill>
-              </a:rPr>
-              <a:t>Given the following plot showing the performance of a Continual Learning model, d</a:t>
-            </a:r>
-            <a:r>
-              <a:rPr lang="en-GB" sz="2600" b="0" i="0" dirty="0">
-                <a:solidFill>
-                  <a:srgbClr val="242424"/>
-                </a:solidFill>
-                <a:effectLst/>
-              </a:rPr>
-              <a:t>escribes the learning </a:t>
-            </a:r>
-            <a:r>
-              <a:rPr lang="en-GB" sz="2600" dirty="0">
-                <a:solidFill>
-                  <a:srgbClr val="242424"/>
-                </a:solidFill>
-              </a:rPr>
-              <a:t>abilities of the model.</a:t>
-            </a:r>
-            <a:endParaRPr lang="en-GB" sz="2600" b="0" i="0" dirty="0">
-              <a:solidFill>
-                <a:srgbClr val="242424"/>
-              </a:solidFill>
-              <a:effectLst/>
-            </a:endParaRPr>
-          </a:p>
-        </p:txBody>
-      </p:sp>
-      <p:sp>
-        <p:nvSpPr>
-          <p:cNvPr id="4" name="CasellaDiTesto 3">
-            <a:extLst>
-              <a:ext uri="{FF2B5EF4-FFF2-40B4-BE49-F238E27FC236}">
-                <a16:creationId xmlns:a16="http://schemas.microsoft.com/office/drawing/2014/main" id="{E5C116AD-5B62-5B21-F3A9-17B6E0E0B4F9}"/>
-              </a:ext>
-            </a:extLst>
-          </p:cNvPr>
-          <p:cNvSpPr txBox="1"/>
-          <p:nvPr/>
-        </p:nvSpPr>
-        <p:spPr>
-          <a:xfrm>
-            <a:off x="838200" y="5550985"/>
-            <a:ext cx="6934200" cy="892552"/>
-          </a:xfrm>
-          <a:prstGeom prst="rect">
-            <a:avLst/>
-          </a:prstGeom>
-          <a:noFill/>
-        </p:spPr>
-        <p:txBody>
-          <a:bodyPr wrap="square">
-            <a:spAutoFit/>
-          </a:bodyPr>
-          <a:lstStyle/>
-          <a:p>
-            <a:r>
-              <a:rPr lang="en-GB" sz="2600" dirty="0">
-                <a:cs typeface="Calibri"/>
-              </a:rPr>
-              <a:t>For</a:t>
-            </a:r>
-            <a:r>
-              <a:rPr lang="en-GB" sz="2600" spc="-5" dirty="0">
-                <a:cs typeface="Calibri"/>
-              </a:rPr>
-              <a:t> </a:t>
-            </a:r>
-            <a:r>
-              <a:rPr lang="en-GB" sz="2600" dirty="0">
-                <a:cs typeface="Calibri"/>
-              </a:rPr>
-              <a:t>the</a:t>
-            </a:r>
-            <a:r>
-              <a:rPr lang="en-GB" sz="2600" spc="20" dirty="0">
-                <a:cs typeface="Calibri"/>
-              </a:rPr>
-              <a:t> </a:t>
-            </a:r>
-            <a:r>
-              <a:rPr lang="en-GB" sz="2600" dirty="0">
-                <a:cs typeface="Calibri"/>
-              </a:rPr>
-              <a:t>solution</a:t>
-            </a:r>
-            <a:r>
-              <a:rPr lang="en-GB" sz="2600" spc="5" dirty="0">
-                <a:cs typeface="Calibri"/>
-              </a:rPr>
-              <a:t> </a:t>
-            </a:r>
-            <a:r>
-              <a:rPr lang="en-GB" sz="2600" dirty="0">
-                <a:cs typeface="Calibri"/>
-              </a:rPr>
-              <a:t>see slides 9-11 of 10_1_CL.pdf and </a:t>
-            </a:r>
-            <a:r>
-              <a:rPr lang="en-GB" sz="2600" dirty="0" err="1">
-                <a:cs typeface="Calibri"/>
-              </a:rPr>
-              <a:t>intro_to_CL.ipynb</a:t>
-            </a:r>
-            <a:endParaRPr lang="en-GB" sz="2600" dirty="0"/>
-          </a:p>
-        </p:txBody>
-      </p:sp>
     </p:spTree>
     <p:extLst>
       <p:ext uri="{BB962C8B-B14F-4D97-AF65-F5344CB8AC3E}">
-        <p14:creationId xmlns:p14="http://schemas.microsoft.com/office/powerpoint/2010/main" val="804360266"/>
+        <p14:creationId xmlns:p14="http://schemas.microsoft.com/office/powerpoint/2010/main" val="3965805136"/>
       </p:ext>
     </p:extLst>
   </p:cSld>
@@ -9296,184 +9891,9 @@
             </a:r>
             <a:r>
               <a:rPr lang="en-GB" b="1" dirty="0"/>
-              <a:t>SML</a:t>
+              <a:t>TSA</a:t>
             </a:r>
             <a:endParaRPr lang="it-IT" b="1" dirty="0"/>
-          </a:p>
-        </p:txBody>
-      </p:sp>
-      <p:sp>
-        <p:nvSpPr>
-          <p:cNvPr id="10" name="Content Placeholder 9">
-            <a:extLst>
-              <a:ext uri="{FF2B5EF4-FFF2-40B4-BE49-F238E27FC236}">
-                <a16:creationId xmlns:a16="http://schemas.microsoft.com/office/drawing/2014/main" id="{74517F86-4B29-7742-9D41-82F9D9CAC7B3}"/>
-              </a:ext>
-            </a:extLst>
-          </p:cNvPr>
-          <p:cNvSpPr>
-            <a:spLocks noGrp="1"/>
-          </p:cNvSpPr>
-          <p:nvPr>
-            <p:ph idx="1"/>
-          </p:nvPr>
-        </p:nvSpPr>
-        <p:spPr>
-          <a:xfrm>
-            <a:off x="838200" y="1825625"/>
-            <a:ext cx="10791092" cy="4351339"/>
-          </a:xfrm>
-          <a:noFill/>
-        </p:spPr>
-        <p:txBody>
-          <a:bodyPr>
-            <a:normAutofit/>
-          </a:bodyPr>
-          <a:lstStyle/>
-          <a:p>
-            <a:r>
-              <a:rPr lang="en-GB" dirty="0"/>
-              <a:t>Code-snippets fill-in &amp; comment</a:t>
-            </a:r>
-          </a:p>
-          <a:p>
-            <a:pPr marL="0" indent="0">
-              <a:buNone/>
-            </a:pPr>
-            <a:endParaRPr lang="en-GB" dirty="0"/>
-          </a:p>
-          <a:p>
-            <a:pPr marL="0" indent="0">
-              <a:buNone/>
-            </a:pPr>
-            <a:r>
-              <a:rPr lang="en-GB" sz="2400" dirty="0"/>
-              <a:t>model = ……………………………………………………………</a:t>
-            </a:r>
-            <a:br>
-              <a:rPr lang="en-GB" sz="2400" dirty="0"/>
-            </a:br>
-            <a:r>
-              <a:rPr lang="en-GB" sz="2400" dirty="0"/>
-              <a:t>metric = …………………………………………………………… </a:t>
-            </a:r>
-            <a:br>
-              <a:rPr lang="en-GB" sz="2400" dirty="0"/>
-            </a:br>
-            <a:r>
-              <a:rPr lang="en-GB" sz="2400" dirty="0"/>
-              <a:t>stream = </a:t>
-            </a:r>
-            <a:r>
-              <a:rPr lang="en-GB" sz="2400" dirty="0" err="1"/>
-              <a:t>iter_pandas</a:t>
-            </a:r>
-            <a:r>
-              <a:rPr lang="en-GB" sz="2400" dirty="0"/>
-              <a:t>(X=data[features], y=data['class’])</a:t>
-            </a:r>
-            <a:br>
-              <a:rPr lang="en-GB" sz="2400" dirty="0"/>
-            </a:br>
-            <a:r>
-              <a:rPr lang="en-GB" sz="2400" dirty="0" err="1"/>
-              <a:t>progressive_val_score</a:t>
-            </a:r>
-            <a:r>
-              <a:rPr lang="en-GB" sz="2400" dirty="0"/>
-              <a:t>(…………………………………….,</a:t>
-            </a:r>
-            <a:br>
-              <a:rPr lang="en-GB" sz="2400" dirty="0"/>
-            </a:br>
-            <a:r>
-              <a:rPr lang="en-GB" sz="2400" dirty="0"/>
-              <a:t>		         …………………………………….,</a:t>
-            </a:r>
-            <a:br>
-              <a:rPr lang="en-GB" sz="2400" dirty="0"/>
-            </a:br>
-            <a:r>
-              <a:rPr lang="en-GB" sz="2400" dirty="0"/>
-              <a:t>		         …………………………………….,</a:t>
-            </a:r>
-            <a:br>
-              <a:rPr lang="en-GB" sz="2400" dirty="0"/>
-            </a:br>
-            <a:r>
-              <a:rPr lang="en-GB" sz="2400" dirty="0"/>
-              <a:t>		         </a:t>
-            </a:r>
-            <a:r>
-              <a:rPr lang="en-GB" sz="2400" dirty="0" err="1"/>
-              <a:t>print_every</a:t>
-            </a:r>
-            <a:r>
-              <a:rPr lang="en-GB" sz="2400" dirty="0"/>
-              <a:t>=1000)</a:t>
-            </a:r>
-          </a:p>
-          <a:p>
-            <a:pPr marL="0" indent="0">
-              <a:buNone/>
-            </a:pPr>
-            <a:endParaRPr lang="en-GB" sz="2000" dirty="0"/>
-          </a:p>
-          <a:p>
-            <a:pPr marL="0" indent="0">
-              <a:buNone/>
-            </a:pPr>
-            <a:r>
-              <a:rPr lang="en-GB" sz="2400" dirty="0">
-                <a:cs typeface="Calibri"/>
-              </a:rPr>
-              <a:t>For</a:t>
-            </a:r>
-            <a:r>
-              <a:rPr lang="en-GB" sz="2400" spc="-5" dirty="0">
-                <a:cs typeface="Calibri"/>
-              </a:rPr>
-              <a:t> </a:t>
-            </a:r>
-            <a:r>
-              <a:rPr lang="en-GB" sz="2400" dirty="0">
-                <a:cs typeface="Calibri"/>
-              </a:rPr>
-              <a:t>the</a:t>
-            </a:r>
-            <a:r>
-              <a:rPr lang="en-GB" sz="2400" spc="20" dirty="0">
-                <a:cs typeface="Calibri"/>
-              </a:rPr>
-              <a:t> </a:t>
-            </a:r>
-            <a:r>
-              <a:rPr lang="en-GB" sz="2400" dirty="0">
-                <a:cs typeface="Calibri"/>
-              </a:rPr>
-              <a:t>solution</a:t>
-            </a:r>
-            <a:r>
-              <a:rPr lang="en-GB" sz="2400" spc="5" dirty="0">
-                <a:cs typeface="Calibri"/>
-              </a:rPr>
-              <a:t> </a:t>
-            </a:r>
-            <a:r>
-              <a:rPr lang="en-GB" sz="2400" dirty="0">
-                <a:cs typeface="Calibri"/>
-              </a:rPr>
-              <a:t>see </a:t>
-            </a:r>
-            <a:r>
-              <a:rPr lang="en-GB" sz="2400" dirty="0" err="1">
-                <a:cs typeface="Calibri"/>
-              </a:rPr>
-              <a:t>Stream_Classification.ipynb</a:t>
-            </a:r>
-            <a:endParaRPr lang="en-GB" sz="2400" dirty="0">
-              <a:cs typeface="Calibri"/>
-            </a:endParaRPr>
           </a:p>
         </p:txBody>
       </p:sp>
@@ -9534,10 +9954,219 @@
           </a:p>
         </p:txBody>
       </p:sp>
+      <p:sp>
+        <p:nvSpPr>
+          <p:cNvPr id="2" name="Content Placeholder 9">
+            <a:extLst>
+              <a:ext uri="{FF2B5EF4-FFF2-40B4-BE49-F238E27FC236}">
+                <a16:creationId xmlns:a16="http://schemas.microsoft.com/office/drawing/2014/main" id="{55645E1E-3978-DF03-62D4-FA1933095CFD}"/>
+              </a:ext>
+            </a:extLst>
+          </p:cNvPr>
+          <p:cNvSpPr>
+            <a:spLocks noGrp="1"/>
+          </p:cNvSpPr>
+          <p:nvPr>
+            <p:ph idx="1"/>
+          </p:nvPr>
+        </p:nvSpPr>
+        <p:spPr>
+          <a:xfrm>
+            <a:off x="838200" y="1580328"/>
+            <a:ext cx="10891345" cy="4187426"/>
+          </a:xfrm>
+          <a:solidFill>
+            <a:srgbClr val="FFC000"/>
+          </a:solidFill>
+        </p:spPr>
+        <p:txBody>
+          <a:bodyPr>
+            <a:normAutofit fontScale="92500" lnSpcReduction="10000"/>
+          </a:bodyPr>
+          <a:lstStyle/>
+          <a:p>
+            <a:r>
+              <a:rPr lang="en-GB" dirty="0"/>
+              <a:t>Problem solving</a:t>
+            </a:r>
+          </a:p>
+          <a:p>
+            <a:pPr lvl="1"/>
+            <a:r>
+              <a:rPr lang="en-GB" dirty="0"/>
+              <a:t>Given the following time series, describe which algorithms you would use and why, listing the expected results</a:t>
+            </a:r>
+          </a:p>
+          <a:p>
+            <a:pPr lvl="1"/>
+            <a:endParaRPr lang="en-GB" dirty="0"/>
+          </a:p>
+          <a:p>
+            <a:pPr lvl="1"/>
+            <a:endParaRPr lang="en-GB" dirty="0"/>
+          </a:p>
+          <a:p>
+            <a:pPr lvl="1"/>
+            <a:endParaRPr lang="en-GB" dirty="0"/>
+          </a:p>
+          <a:p>
+            <a:pPr lvl="1"/>
+            <a:endParaRPr lang="en-GB" dirty="0"/>
+          </a:p>
+          <a:p>
+            <a:pPr lvl="1"/>
+            <a:endParaRPr lang="en-GB" dirty="0"/>
+          </a:p>
+          <a:p>
+            <a:pPr lvl="1"/>
+            <a:endParaRPr lang="en-GB" dirty="0"/>
+          </a:p>
+          <a:p>
+            <a:pPr lvl="1"/>
+            <a:endParaRPr lang="en-GB" dirty="0"/>
+          </a:p>
+          <a:p>
+            <a:pPr lvl="1"/>
+            <a:r>
+              <a:rPr lang="en-GB" dirty="0"/>
+              <a:t>Given specific outputs from ACF and PACF plots, describe which order you would use for a SARIMA model, and what conclusion you would come to with the model diagnostic</a:t>
+            </a:r>
+          </a:p>
+        </p:txBody>
+      </p:sp>
+      <p:pic>
+        <p:nvPicPr>
+          <p:cNvPr id="1026" name="Picture 2">
+            <a:extLst>
+              <a:ext uri="{FF2B5EF4-FFF2-40B4-BE49-F238E27FC236}">
+                <a16:creationId xmlns:a16="http://schemas.microsoft.com/office/drawing/2014/main" id="{7060E517-C15D-F9FE-C9B8-5BF0642CF23D}"/>
+              </a:ext>
+            </a:extLst>
+          </p:cNvPr>
+          <p:cNvPicPr>
+            <a:picLocks noChangeAspect="1" noChangeArrowheads="1"/>
+          </p:cNvPicPr>
+          <p:nvPr/>
+        </p:nvPicPr>
+        <p:blipFill>
+          <a:blip r:embed="rId3">
+            <a:extLst>
+              <a:ext uri="{28A0092B-C50C-407E-A947-70E740481C1C}">
+                <a14:useLocalDpi xmlns:a14="http://schemas.microsoft.com/office/drawing/2010/main" val="0"/>
+              </a:ext>
+            </a:extLst>
+          </a:blip>
+          <a:srcRect/>
+          <a:stretch>
+            <a:fillRect/>
+          </a:stretch>
+        </p:blipFill>
+        <p:spPr bwMode="auto">
+          <a:xfrm>
+            <a:off x="4579554" y="2669731"/>
+            <a:ext cx="3032891" cy="2118980"/>
+          </a:xfrm>
+          <a:prstGeom prst="rect">
+            <a:avLst/>
+          </a:prstGeom>
+          <a:noFill/>
+          <a:extLst>
+            <a:ext uri="{909E8E84-426E-40DD-AFC4-6F175D3DCCD1}">
+              <a14:hiddenFill xmlns:a14="http://schemas.microsoft.com/office/drawing/2010/main">
+                <a:solidFill>
+                  <a:srgbClr val="FFFFFF"/>
+                </a:solidFill>
+              </a14:hiddenFill>
+            </a:ext>
+          </a:extLst>
+        </p:spPr>
+      </p:pic>
+      <p:sp>
+        <p:nvSpPr>
+          <p:cNvPr id="4" name="CasellaDiTesto 3">
+            <a:extLst>
+              <a:ext uri="{FF2B5EF4-FFF2-40B4-BE49-F238E27FC236}">
+                <a16:creationId xmlns:a16="http://schemas.microsoft.com/office/drawing/2014/main" id="{50B62FD4-3491-4A74-8F56-C9ADAB8BD3F2}"/>
+              </a:ext>
+            </a:extLst>
+          </p:cNvPr>
+          <p:cNvSpPr txBox="1"/>
+          <p:nvPr/>
+        </p:nvSpPr>
+        <p:spPr>
+          <a:xfrm>
+            <a:off x="838199" y="5767754"/>
+            <a:ext cx="10891345" cy="461665"/>
+          </a:xfrm>
+          <a:prstGeom prst="rect">
+            <a:avLst/>
+          </a:prstGeom>
+          <a:noFill/>
+        </p:spPr>
+        <p:txBody>
+          <a:bodyPr wrap="square">
+            <a:spAutoFit/>
+          </a:bodyPr>
+          <a:lstStyle/>
+          <a:p>
+            <a:pPr marL="0" indent="0">
+              <a:buNone/>
+            </a:pPr>
+            <a:r>
+              <a:rPr lang="it-IT" sz="2400" dirty="0">
+                <a:cs typeface="Calibri"/>
+              </a:rPr>
+              <a:t>For</a:t>
+            </a:r>
+            <a:r>
+              <a:rPr lang="it-IT" sz="2400" spc="-5" dirty="0">
+                <a:cs typeface="Calibri"/>
+              </a:rPr>
+              <a:t> </a:t>
+            </a:r>
+            <a:r>
+              <a:rPr lang="it-IT" sz="2400" dirty="0">
+                <a:cs typeface="Calibri"/>
+              </a:rPr>
+              <a:t>a facsimile</a:t>
+            </a:r>
+            <a:r>
+              <a:rPr lang="it-IT" sz="2400" spc="20" dirty="0">
+                <a:cs typeface="Calibri"/>
+              </a:rPr>
+              <a:t> </a:t>
+            </a:r>
+            <a:r>
+              <a:rPr lang="it-IT" sz="2400" dirty="0">
+                <a:cs typeface="Calibri"/>
+              </a:rPr>
+              <a:t>solution</a:t>
+            </a:r>
+            <a:r>
+              <a:rPr lang="it-IT" sz="2400" spc="5" dirty="0">
+                <a:cs typeface="Calibri"/>
+              </a:rPr>
+              <a:t> </a:t>
+            </a:r>
+            <a:r>
+              <a:rPr lang="it-IT" sz="2400" dirty="0" err="1">
+                <a:cs typeface="Calibri"/>
+              </a:rPr>
+              <a:t>see</a:t>
+            </a:r>
+            <a:r>
+              <a:rPr lang="it-IT" sz="2400" dirty="0">
+                <a:cs typeface="Calibri"/>
+              </a:rPr>
+              <a:t> TSA_09_SARIMA.ipynb and TSA_06_Forecasting_Sol.ipynb </a:t>
+            </a:r>
+          </a:p>
+        </p:txBody>
+      </p:sp>
     </p:spTree>
     <p:extLst>
       <p:ext uri="{BB962C8B-B14F-4D97-AF65-F5344CB8AC3E}">
-        <p14:creationId xmlns:p14="http://schemas.microsoft.com/office/powerpoint/2010/main" val="1823437186"/>
+        <p14:creationId xmlns:p14="http://schemas.microsoft.com/office/powerpoint/2010/main" val="3410039972"/>
       </p:ext>
     </p:extLst>
   </p:cSld>

</xml_diff>